<commit_message>
Add SmartGit to demo slides
</commit_message>
<xml_diff>
--- a/slides/01-Version-Control-Systems.pptx
+++ b/slides/01-Version-Control-Systems.pptx
@@ -62,7 +62,7 @@
       </p:grpSpPr>
       <p:sp>
         <p:nvSpPr>
-          <p:cNvPr id="26" name="PlaceHolder 1"/>
+          <p:cNvPr id="23" name="PlaceHolder 1"/>
           <p:cNvSpPr>
             <a:spLocks noGrp="1"/>
           </p:cNvSpPr>
@@ -72,8 +72,8 @@
         </p:nvSpPr>
         <p:spPr>
           <a:xfrm>
-            <a:off x="457200" y="274680"/>
-            <a:ext cx="8229240" cy="1142640"/>
+            <a:off x="457200" y="273600"/>
+            <a:ext cx="8229240" cy="1144800"/>
           </a:xfrm>
           <a:prstGeom prst="rect">
             <a:avLst/>
@@ -82,13 +82,14 @@
         <p:txBody>
           <a:bodyPr lIns="0" rIns="0" tIns="0" bIns="0" anchor="ctr"/>
           <a:p>
-            <a:endParaRPr/>
-          </a:p>
-        </p:txBody>
-      </p:sp>
-      <p:sp>
-        <p:nvSpPr>
-          <p:cNvPr id="27" name="PlaceHolder 2"/>
+            <a:pPr algn="ctr"/>
+            <a:endParaRPr/>
+          </a:p>
+        </p:txBody>
+      </p:sp>
+      <p:sp>
+        <p:nvSpPr>
+          <p:cNvPr id="24" name="PlaceHolder 2"/>
           <p:cNvSpPr>
             <a:spLocks noGrp="1"/>
           </p:cNvSpPr>
@@ -98,8 +99,8 @@
         </p:nvSpPr>
         <p:spPr>
           <a:xfrm>
-            <a:off x="457200" y="1600200"/>
-            <a:ext cx="8229240" cy="2158560"/>
+            <a:off x="457200" y="1604520"/>
+            <a:ext cx="8229240" cy="1896840"/>
           </a:xfrm>
           <a:prstGeom prst="rect">
             <a:avLst/>
@@ -114,7 +115,7 @@
       </p:sp>
       <p:sp>
         <p:nvSpPr>
-          <p:cNvPr id="28" name="PlaceHolder 3"/>
+          <p:cNvPr id="25" name="PlaceHolder 3"/>
           <p:cNvSpPr>
             <a:spLocks noGrp="1"/>
           </p:cNvSpPr>
@@ -124,8 +125,8 @@
         </p:nvSpPr>
         <p:spPr>
           <a:xfrm>
-            <a:off x="457200" y="3964320"/>
-            <a:ext cx="8229240" cy="2158560"/>
+            <a:off x="457200" y="3682080"/>
+            <a:ext cx="8229240" cy="1896840"/>
           </a:xfrm>
           <a:prstGeom prst="rect">
             <a:avLst/>
@@ -162,7 +163,7 @@
       </p:grpSpPr>
       <p:sp>
         <p:nvSpPr>
-          <p:cNvPr id="29" name="PlaceHolder 1"/>
+          <p:cNvPr id="26" name="PlaceHolder 1"/>
           <p:cNvSpPr>
             <a:spLocks noGrp="1"/>
           </p:cNvSpPr>
@@ -172,8 +173,8 @@
         </p:nvSpPr>
         <p:spPr>
           <a:xfrm>
-            <a:off x="457200" y="274680"/>
-            <a:ext cx="8229240" cy="1142640"/>
+            <a:off x="457200" y="273600"/>
+            <a:ext cx="8229240" cy="1144800"/>
           </a:xfrm>
           <a:prstGeom prst="rect">
             <a:avLst/>
@@ -182,13 +183,14 @@
         <p:txBody>
           <a:bodyPr lIns="0" rIns="0" tIns="0" bIns="0" anchor="ctr"/>
           <a:p>
-            <a:endParaRPr/>
-          </a:p>
-        </p:txBody>
-      </p:sp>
-      <p:sp>
-        <p:nvSpPr>
-          <p:cNvPr id="30" name="PlaceHolder 2"/>
+            <a:pPr algn="ctr"/>
+            <a:endParaRPr/>
+          </a:p>
+        </p:txBody>
+      </p:sp>
+      <p:sp>
+        <p:nvSpPr>
+          <p:cNvPr id="27" name="PlaceHolder 2"/>
           <p:cNvSpPr>
             <a:spLocks noGrp="1"/>
           </p:cNvSpPr>
@@ -198,8 +200,8 @@
         </p:nvSpPr>
         <p:spPr>
           <a:xfrm>
-            <a:off x="457200" y="1600200"/>
-            <a:ext cx="4015800" cy="2158560"/>
+            <a:off x="457200" y="1604520"/>
+            <a:ext cx="4015800" cy="1896840"/>
           </a:xfrm>
           <a:prstGeom prst="rect">
             <a:avLst/>
@@ -214,7 +216,7 @@
       </p:sp>
       <p:sp>
         <p:nvSpPr>
-          <p:cNvPr id="31" name="PlaceHolder 3"/>
+          <p:cNvPr id="28" name="PlaceHolder 3"/>
           <p:cNvSpPr>
             <a:spLocks noGrp="1"/>
           </p:cNvSpPr>
@@ -224,8 +226,8 @@
         </p:nvSpPr>
         <p:spPr>
           <a:xfrm>
-            <a:off x="4674240" y="1600200"/>
-            <a:ext cx="4015800" cy="2158560"/>
+            <a:off x="4674240" y="1604520"/>
+            <a:ext cx="4015800" cy="1896840"/>
           </a:xfrm>
           <a:prstGeom prst="rect">
             <a:avLst/>
@@ -240,7 +242,7 @@
       </p:sp>
       <p:sp>
         <p:nvSpPr>
-          <p:cNvPr id="32" name="PlaceHolder 4"/>
+          <p:cNvPr id="29" name="PlaceHolder 4"/>
           <p:cNvSpPr>
             <a:spLocks noGrp="1"/>
           </p:cNvSpPr>
@@ -250,8 +252,8 @@
         </p:nvSpPr>
         <p:spPr>
           <a:xfrm>
-            <a:off x="4674240" y="3964320"/>
-            <a:ext cx="4015800" cy="2158560"/>
+            <a:off x="4674240" y="3682080"/>
+            <a:ext cx="4015800" cy="1896840"/>
           </a:xfrm>
           <a:prstGeom prst="rect">
             <a:avLst/>
@@ -266,7 +268,7 @@
       </p:sp>
       <p:sp>
         <p:nvSpPr>
-          <p:cNvPr id="33" name="PlaceHolder 5"/>
+          <p:cNvPr id="30" name="PlaceHolder 5"/>
           <p:cNvSpPr>
             <a:spLocks noGrp="1"/>
           </p:cNvSpPr>
@@ -276,8 +278,8 @@
         </p:nvSpPr>
         <p:spPr>
           <a:xfrm>
-            <a:off x="457200" y="3964320"/>
-            <a:ext cx="4015800" cy="2158560"/>
+            <a:off x="457200" y="3682080"/>
+            <a:ext cx="4015800" cy="1896840"/>
           </a:xfrm>
           <a:prstGeom prst="rect">
             <a:avLst/>
@@ -314,7 +316,7 @@
       </p:grpSpPr>
       <p:sp>
         <p:nvSpPr>
-          <p:cNvPr id="34" name="PlaceHolder 1"/>
+          <p:cNvPr id="31" name="PlaceHolder 1"/>
           <p:cNvSpPr>
             <a:spLocks noGrp="1"/>
           </p:cNvSpPr>
@@ -324,8 +326,8 @@
         </p:nvSpPr>
         <p:spPr>
           <a:xfrm>
-            <a:off x="457200" y="274680"/>
-            <a:ext cx="8229240" cy="1142640"/>
+            <a:off x="457200" y="273600"/>
+            <a:ext cx="8229240" cy="1144800"/>
           </a:xfrm>
           <a:prstGeom prst="rect">
             <a:avLst/>
@@ -334,13 +336,14 @@
         <p:txBody>
           <a:bodyPr lIns="0" rIns="0" tIns="0" bIns="0" anchor="ctr"/>
           <a:p>
-            <a:endParaRPr/>
-          </a:p>
-        </p:txBody>
-      </p:sp>
-      <p:sp>
-        <p:nvSpPr>
-          <p:cNvPr id="35" name="PlaceHolder 2"/>
+            <a:pPr algn="ctr"/>
+            <a:endParaRPr/>
+          </a:p>
+        </p:txBody>
+      </p:sp>
+      <p:sp>
+        <p:nvSpPr>
+          <p:cNvPr id="32" name="PlaceHolder 2"/>
           <p:cNvSpPr>
             <a:spLocks noGrp="1"/>
           </p:cNvSpPr>
@@ -350,8 +353,8 @@
         </p:nvSpPr>
         <p:spPr>
           <a:xfrm>
-            <a:off x="457200" y="1600200"/>
-            <a:ext cx="8229240" cy="4525560"/>
+            <a:off x="457200" y="1604520"/>
+            <a:ext cx="8229240" cy="3977280"/>
           </a:xfrm>
           <a:prstGeom prst="rect">
             <a:avLst/>
@@ -366,7 +369,7 @@
       </p:sp>
       <p:sp>
         <p:nvSpPr>
-          <p:cNvPr id="36" name="PlaceHolder 3"/>
+          <p:cNvPr id="33" name="PlaceHolder 3"/>
           <p:cNvSpPr>
             <a:spLocks noGrp="1"/>
           </p:cNvSpPr>
@@ -376,8 +379,8 @@
         </p:nvSpPr>
         <p:spPr>
           <a:xfrm>
-            <a:off x="457200" y="1600200"/>
-            <a:ext cx="8229240" cy="4525560"/>
+            <a:off x="457200" y="1604520"/>
+            <a:ext cx="8229240" cy="3977280"/>
           </a:xfrm>
           <a:prstGeom prst="rect">
             <a:avLst/>
@@ -392,7 +395,7 @@
       </p:sp>
       <p:pic>
         <p:nvPicPr>
-          <p:cNvPr id="37" name="" descr=""/>
+          <p:cNvPr id="34" name="" descr=""/>
           <p:cNvPicPr/>
           <p:nvPr/>
         </p:nvPicPr>
@@ -402,8 +405,8 @@
         </p:blipFill>
         <p:spPr>
           <a:xfrm>
-            <a:off x="1735560" y="1599840"/>
-            <a:ext cx="5671800" cy="4525560"/>
+            <a:off x="2079000" y="1604520"/>
+            <a:ext cx="4984920" cy="3977280"/>
           </a:xfrm>
           <a:prstGeom prst="rect">
             <a:avLst/>
@@ -415,7 +418,7 @@
       </p:pic>
       <p:pic>
         <p:nvPicPr>
-          <p:cNvPr id="38" name="" descr=""/>
+          <p:cNvPr id="35" name="" descr=""/>
           <p:cNvPicPr/>
           <p:nvPr/>
         </p:nvPicPr>
@@ -425,8 +428,8 @@
         </p:blipFill>
         <p:spPr>
           <a:xfrm>
-            <a:off x="1735560" y="1599840"/>
-            <a:ext cx="5671800" cy="4525560"/>
+            <a:off x="2079000" y="1604520"/>
+            <a:ext cx="4984920" cy="3977280"/>
           </a:xfrm>
           <a:prstGeom prst="rect">
             <a:avLst/>
@@ -482,7 +485,7 @@
       </p:grpSpPr>
       <p:sp>
         <p:nvSpPr>
-          <p:cNvPr id="44" name="PlaceHolder 1"/>
+          <p:cNvPr id="38" name="PlaceHolder 1"/>
           <p:cNvSpPr>
             <a:spLocks noGrp="1"/>
           </p:cNvSpPr>
@@ -492,8 +495,8 @@
         </p:nvSpPr>
         <p:spPr>
           <a:xfrm>
-            <a:off x="457200" y="274680"/>
-            <a:ext cx="8229240" cy="1142640"/>
+            <a:off x="457200" y="273600"/>
+            <a:ext cx="8229240" cy="1144800"/>
           </a:xfrm>
           <a:prstGeom prst="rect">
             <a:avLst/>
@@ -502,13 +505,14 @@
         <p:txBody>
           <a:bodyPr lIns="0" rIns="0" tIns="0" bIns="0" anchor="ctr"/>
           <a:p>
-            <a:endParaRPr/>
-          </a:p>
-        </p:txBody>
-      </p:sp>
-      <p:sp>
-        <p:nvSpPr>
-          <p:cNvPr id="45" name="PlaceHolder 2"/>
+            <a:pPr algn="ctr"/>
+            <a:endParaRPr/>
+          </a:p>
+        </p:txBody>
+      </p:sp>
+      <p:sp>
+        <p:nvSpPr>
+          <p:cNvPr id="39" name="PlaceHolder 2"/>
           <p:cNvSpPr>
             <a:spLocks noGrp="1"/>
           </p:cNvSpPr>
@@ -518,8 +522,8 @@
         </p:nvSpPr>
         <p:spPr>
           <a:xfrm>
-            <a:off x="457200" y="1600200"/>
-            <a:ext cx="8229240" cy="4525560"/>
+            <a:off x="457200" y="1604520"/>
+            <a:ext cx="8229240" cy="3977280"/>
           </a:xfrm>
           <a:prstGeom prst="rect">
             <a:avLst/>
@@ -557,7 +561,7 @@
       </p:grpSpPr>
       <p:sp>
         <p:nvSpPr>
-          <p:cNvPr id="46" name="PlaceHolder 1"/>
+          <p:cNvPr id="40" name="PlaceHolder 1"/>
           <p:cNvSpPr>
             <a:spLocks noGrp="1"/>
           </p:cNvSpPr>
@@ -567,8 +571,8 @@
         </p:nvSpPr>
         <p:spPr>
           <a:xfrm>
-            <a:off x="457200" y="274680"/>
-            <a:ext cx="8229240" cy="1142640"/>
+            <a:off x="457200" y="273600"/>
+            <a:ext cx="8229240" cy="1144800"/>
           </a:xfrm>
           <a:prstGeom prst="rect">
             <a:avLst/>
@@ -577,13 +581,14 @@
         <p:txBody>
           <a:bodyPr lIns="0" rIns="0" tIns="0" bIns="0" anchor="ctr"/>
           <a:p>
-            <a:endParaRPr/>
-          </a:p>
-        </p:txBody>
-      </p:sp>
-      <p:sp>
-        <p:nvSpPr>
-          <p:cNvPr id="47" name="PlaceHolder 2"/>
+            <a:pPr algn="ctr"/>
+            <a:endParaRPr/>
+          </a:p>
+        </p:txBody>
+      </p:sp>
+      <p:sp>
+        <p:nvSpPr>
+          <p:cNvPr id="41" name="PlaceHolder 2"/>
           <p:cNvSpPr>
             <a:spLocks noGrp="1"/>
           </p:cNvSpPr>
@@ -593,8 +598,8 @@
         </p:nvSpPr>
         <p:spPr>
           <a:xfrm>
-            <a:off x="457200" y="1600200"/>
-            <a:ext cx="8229240" cy="4525560"/>
+            <a:off x="457200" y="1604520"/>
+            <a:ext cx="8229240" cy="3977280"/>
           </a:xfrm>
           <a:prstGeom prst="rect">
             <a:avLst/>
@@ -631,7 +636,7 @@
       </p:grpSpPr>
       <p:sp>
         <p:nvSpPr>
-          <p:cNvPr id="48" name="PlaceHolder 1"/>
+          <p:cNvPr id="42" name="PlaceHolder 1"/>
           <p:cNvSpPr>
             <a:spLocks noGrp="1"/>
           </p:cNvSpPr>
@@ -641,8 +646,8 @@
         </p:nvSpPr>
         <p:spPr>
           <a:xfrm>
-            <a:off x="457200" y="274680"/>
-            <a:ext cx="8229240" cy="1142640"/>
+            <a:off x="457200" y="273600"/>
+            <a:ext cx="8229240" cy="1144800"/>
           </a:xfrm>
           <a:prstGeom prst="rect">
             <a:avLst/>
@@ -651,13 +656,14 @@
         <p:txBody>
           <a:bodyPr lIns="0" rIns="0" tIns="0" bIns="0" anchor="ctr"/>
           <a:p>
-            <a:endParaRPr/>
-          </a:p>
-        </p:txBody>
-      </p:sp>
-      <p:sp>
-        <p:nvSpPr>
-          <p:cNvPr id="49" name="PlaceHolder 2"/>
+            <a:pPr algn="ctr"/>
+            <a:endParaRPr/>
+          </a:p>
+        </p:txBody>
+      </p:sp>
+      <p:sp>
+        <p:nvSpPr>
+          <p:cNvPr id="43" name="PlaceHolder 2"/>
           <p:cNvSpPr>
             <a:spLocks noGrp="1"/>
           </p:cNvSpPr>
@@ -667,8 +673,8 @@
         </p:nvSpPr>
         <p:spPr>
           <a:xfrm>
-            <a:off x="457200" y="1600200"/>
-            <a:ext cx="4015800" cy="4525560"/>
+            <a:off x="457200" y="1604520"/>
+            <a:ext cx="4015800" cy="3977280"/>
           </a:xfrm>
           <a:prstGeom prst="rect">
             <a:avLst/>
@@ -683,7 +689,7 @@
       </p:sp>
       <p:sp>
         <p:nvSpPr>
-          <p:cNvPr id="50" name="PlaceHolder 3"/>
+          <p:cNvPr id="44" name="PlaceHolder 3"/>
           <p:cNvSpPr>
             <a:spLocks noGrp="1"/>
           </p:cNvSpPr>
@@ -693,8 +699,8 @@
         </p:nvSpPr>
         <p:spPr>
           <a:xfrm>
-            <a:off x="4674240" y="1600200"/>
-            <a:ext cx="4015800" cy="4525560"/>
+            <a:off x="4674240" y="1604520"/>
+            <a:ext cx="4015800" cy="3977280"/>
           </a:xfrm>
           <a:prstGeom prst="rect">
             <a:avLst/>
@@ -731,7 +737,7 @@
       </p:grpSpPr>
       <p:sp>
         <p:nvSpPr>
-          <p:cNvPr id="51" name="PlaceHolder 1"/>
+          <p:cNvPr id="45" name="PlaceHolder 1"/>
           <p:cNvSpPr>
             <a:spLocks noGrp="1"/>
           </p:cNvSpPr>
@@ -741,8 +747,8 @@
         </p:nvSpPr>
         <p:spPr>
           <a:xfrm>
-            <a:off x="457200" y="274680"/>
-            <a:ext cx="8229240" cy="1142640"/>
+            <a:off x="457200" y="273600"/>
+            <a:ext cx="8229240" cy="1144800"/>
           </a:xfrm>
           <a:prstGeom prst="rect">
             <a:avLst/>
@@ -751,6 +757,7 @@
         <p:txBody>
           <a:bodyPr lIns="0" rIns="0" tIns="0" bIns="0" anchor="ctr"/>
           <a:p>
+            <a:pPr algn="ctr"/>
             <a:endParaRPr/>
           </a:p>
         </p:txBody>
@@ -779,7 +786,7 @@
       </p:grpSpPr>
       <p:sp>
         <p:nvSpPr>
-          <p:cNvPr id="52" name="PlaceHolder 1"/>
+          <p:cNvPr id="46" name="PlaceHolder 1"/>
           <p:cNvSpPr>
             <a:spLocks noGrp="1"/>
           </p:cNvSpPr>
@@ -789,8 +796,8 @@
         </p:nvSpPr>
         <p:spPr>
           <a:xfrm>
-            <a:off x="457200" y="274680"/>
-            <a:ext cx="8229240" cy="5297760"/>
+            <a:off x="457200" y="273600"/>
+            <a:ext cx="8229240" cy="5307840"/>
           </a:xfrm>
           <a:prstGeom prst="rect">
             <a:avLst/>
@@ -828,7 +835,7 @@
       </p:grpSpPr>
       <p:sp>
         <p:nvSpPr>
-          <p:cNvPr id="53" name="PlaceHolder 1"/>
+          <p:cNvPr id="47" name="PlaceHolder 1"/>
           <p:cNvSpPr>
             <a:spLocks noGrp="1"/>
           </p:cNvSpPr>
@@ -838,8 +845,8 @@
         </p:nvSpPr>
         <p:spPr>
           <a:xfrm>
-            <a:off x="457200" y="274680"/>
-            <a:ext cx="8229240" cy="1142640"/>
+            <a:off x="457200" y="273600"/>
+            <a:ext cx="8229240" cy="1144800"/>
           </a:xfrm>
           <a:prstGeom prst="rect">
             <a:avLst/>
@@ -848,13 +855,14 @@
         <p:txBody>
           <a:bodyPr lIns="0" rIns="0" tIns="0" bIns="0" anchor="ctr"/>
           <a:p>
-            <a:endParaRPr/>
-          </a:p>
-        </p:txBody>
-      </p:sp>
-      <p:sp>
-        <p:nvSpPr>
-          <p:cNvPr id="54" name="PlaceHolder 2"/>
+            <a:pPr algn="ctr"/>
+            <a:endParaRPr/>
+          </a:p>
+        </p:txBody>
+      </p:sp>
+      <p:sp>
+        <p:nvSpPr>
+          <p:cNvPr id="48" name="PlaceHolder 2"/>
           <p:cNvSpPr>
             <a:spLocks noGrp="1"/>
           </p:cNvSpPr>
@@ -864,8 +872,8 @@
         </p:nvSpPr>
         <p:spPr>
           <a:xfrm>
-            <a:off x="457200" y="1600200"/>
-            <a:ext cx="4015800" cy="2158560"/>
+            <a:off x="457200" y="1604520"/>
+            <a:ext cx="4015800" cy="1896840"/>
           </a:xfrm>
           <a:prstGeom prst="rect">
             <a:avLst/>
@@ -880,7 +888,7 @@
       </p:sp>
       <p:sp>
         <p:nvSpPr>
-          <p:cNvPr id="55" name="PlaceHolder 3"/>
+          <p:cNvPr id="49" name="PlaceHolder 3"/>
           <p:cNvSpPr>
             <a:spLocks noGrp="1"/>
           </p:cNvSpPr>
@@ -890,8 +898,8 @@
         </p:nvSpPr>
         <p:spPr>
           <a:xfrm>
-            <a:off x="457200" y="3964320"/>
-            <a:ext cx="4015800" cy="2158560"/>
+            <a:off x="457200" y="3682080"/>
+            <a:ext cx="4015800" cy="1896840"/>
           </a:xfrm>
           <a:prstGeom prst="rect">
             <a:avLst/>
@@ -906,7 +914,7 @@
       </p:sp>
       <p:sp>
         <p:nvSpPr>
-          <p:cNvPr id="56" name="PlaceHolder 4"/>
+          <p:cNvPr id="50" name="PlaceHolder 4"/>
           <p:cNvSpPr>
             <a:spLocks noGrp="1"/>
           </p:cNvSpPr>
@@ -916,8 +924,8 @@
         </p:nvSpPr>
         <p:spPr>
           <a:xfrm>
-            <a:off x="4674240" y="1600200"/>
-            <a:ext cx="4015800" cy="4525560"/>
+            <a:off x="4674240" y="1604520"/>
+            <a:ext cx="4015800" cy="3977280"/>
           </a:xfrm>
           <a:prstGeom prst="rect">
             <a:avLst/>
@@ -954,7 +962,7 @@
       </p:grpSpPr>
       <p:sp>
         <p:nvSpPr>
-          <p:cNvPr id="5" name="PlaceHolder 1"/>
+          <p:cNvPr id="2" name="PlaceHolder 1"/>
           <p:cNvSpPr>
             <a:spLocks noGrp="1"/>
           </p:cNvSpPr>
@@ -964,8 +972,8 @@
         </p:nvSpPr>
         <p:spPr>
           <a:xfrm>
-            <a:off x="457200" y="274680"/>
-            <a:ext cx="8229240" cy="1142640"/>
+            <a:off x="457200" y="273600"/>
+            <a:ext cx="8229240" cy="1144800"/>
           </a:xfrm>
           <a:prstGeom prst="rect">
             <a:avLst/>
@@ -974,13 +982,14 @@
         <p:txBody>
           <a:bodyPr lIns="0" rIns="0" tIns="0" bIns="0" anchor="ctr"/>
           <a:p>
-            <a:endParaRPr/>
-          </a:p>
-        </p:txBody>
-      </p:sp>
-      <p:sp>
-        <p:nvSpPr>
-          <p:cNvPr id="6" name="PlaceHolder 2"/>
+            <a:pPr algn="ctr"/>
+            <a:endParaRPr/>
+          </a:p>
+        </p:txBody>
+      </p:sp>
+      <p:sp>
+        <p:nvSpPr>
+          <p:cNvPr id="3" name="PlaceHolder 2"/>
           <p:cNvSpPr>
             <a:spLocks noGrp="1"/>
           </p:cNvSpPr>
@@ -990,8 +999,8 @@
         </p:nvSpPr>
         <p:spPr>
           <a:xfrm>
-            <a:off x="457200" y="1600200"/>
-            <a:ext cx="8229240" cy="4525560"/>
+            <a:off x="457200" y="1604520"/>
+            <a:ext cx="8229240" cy="3977280"/>
           </a:xfrm>
           <a:prstGeom prst="rect">
             <a:avLst/>
@@ -1029,7 +1038,7 @@
       </p:grpSpPr>
       <p:sp>
         <p:nvSpPr>
-          <p:cNvPr id="57" name="PlaceHolder 1"/>
+          <p:cNvPr id="51" name="PlaceHolder 1"/>
           <p:cNvSpPr>
             <a:spLocks noGrp="1"/>
           </p:cNvSpPr>
@@ -1039,8 +1048,8 @@
         </p:nvSpPr>
         <p:spPr>
           <a:xfrm>
-            <a:off x="457200" y="274680"/>
-            <a:ext cx="8229240" cy="1142640"/>
+            <a:off x="457200" y="273600"/>
+            <a:ext cx="8229240" cy="1144800"/>
           </a:xfrm>
           <a:prstGeom prst="rect">
             <a:avLst/>
@@ -1049,13 +1058,14 @@
         <p:txBody>
           <a:bodyPr lIns="0" rIns="0" tIns="0" bIns="0" anchor="ctr"/>
           <a:p>
-            <a:endParaRPr/>
-          </a:p>
-        </p:txBody>
-      </p:sp>
-      <p:sp>
-        <p:nvSpPr>
-          <p:cNvPr id="58" name="PlaceHolder 2"/>
+            <a:pPr algn="ctr"/>
+            <a:endParaRPr/>
+          </a:p>
+        </p:txBody>
+      </p:sp>
+      <p:sp>
+        <p:nvSpPr>
+          <p:cNvPr id="52" name="PlaceHolder 2"/>
           <p:cNvSpPr>
             <a:spLocks noGrp="1"/>
           </p:cNvSpPr>
@@ -1065,8 +1075,8 @@
         </p:nvSpPr>
         <p:spPr>
           <a:xfrm>
-            <a:off x="457200" y="1600200"/>
-            <a:ext cx="4015800" cy="4525560"/>
+            <a:off x="457200" y="1604520"/>
+            <a:ext cx="4015800" cy="3977280"/>
           </a:xfrm>
           <a:prstGeom prst="rect">
             <a:avLst/>
@@ -1081,7 +1091,7 @@
       </p:sp>
       <p:sp>
         <p:nvSpPr>
-          <p:cNvPr id="59" name="PlaceHolder 3"/>
+          <p:cNvPr id="53" name="PlaceHolder 3"/>
           <p:cNvSpPr>
             <a:spLocks noGrp="1"/>
           </p:cNvSpPr>
@@ -1091,8 +1101,8 @@
         </p:nvSpPr>
         <p:spPr>
           <a:xfrm>
-            <a:off x="4674240" y="1600200"/>
-            <a:ext cx="4015800" cy="2158560"/>
+            <a:off x="4674240" y="1604520"/>
+            <a:ext cx="4015800" cy="1896840"/>
           </a:xfrm>
           <a:prstGeom prst="rect">
             <a:avLst/>
@@ -1107,7 +1117,7 @@
       </p:sp>
       <p:sp>
         <p:nvSpPr>
-          <p:cNvPr id="60" name="PlaceHolder 4"/>
+          <p:cNvPr id="54" name="PlaceHolder 4"/>
           <p:cNvSpPr>
             <a:spLocks noGrp="1"/>
           </p:cNvSpPr>
@@ -1117,8 +1127,8 @@
         </p:nvSpPr>
         <p:spPr>
           <a:xfrm>
-            <a:off x="4674240" y="3964320"/>
-            <a:ext cx="4015800" cy="2158560"/>
+            <a:off x="4674240" y="3682080"/>
+            <a:ext cx="4015800" cy="1896840"/>
           </a:xfrm>
           <a:prstGeom prst="rect">
             <a:avLst/>
@@ -1155,7 +1165,7 @@
       </p:grpSpPr>
       <p:sp>
         <p:nvSpPr>
-          <p:cNvPr id="61" name="PlaceHolder 1"/>
+          <p:cNvPr id="55" name="PlaceHolder 1"/>
           <p:cNvSpPr>
             <a:spLocks noGrp="1"/>
           </p:cNvSpPr>
@@ -1165,8 +1175,8 @@
         </p:nvSpPr>
         <p:spPr>
           <a:xfrm>
-            <a:off x="457200" y="274680"/>
-            <a:ext cx="8229240" cy="1142640"/>
+            <a:off x="457200" y="273600"/>
+            <a:ext cx="8229240" cy="1144800"/>
           </a:xfrm>
           <a:prstGeom prst="rect">
             <a:avLst/>
@@ -1175,13 +1185,14 @@
         <p:txBody>
           <a:bodyPr lIns="0" rIns="0" tIns="0" bIns="0" anchor="ctr"/>
           <a:p>
-            <a:endParaRPr/>
-          </a:p>
-        </p:txBody>
-      </p:sp>
-      <p:sp>
-        <p:nvSpPr>
-          <p:cNvPr id="62" name="PlaceHolder 2"/>
+            <a:pPr algn="ctr"/>
+            <a:endParaRPr/>
+          </a:p>
+        </p:txBody>
+      </p:sp>
+      <p:sp>
+        <p:nvSpPr>
+          <p:cNvPr id="56" name="PlaceHolder 2"/>
           <p:cNvSpPr>
             <a:spLocks noGrp="1"/>
           </p:cNvSpPr>
@@ -1191,8 +1202,8 @@
         </p:nvSpPr>
         <p:spPr>
           <a:xfrm>
-            <a:off x="457200" y="1600200"/>
-            <a:ext cx="4015800" cy="2158560"/>
+            <a:off x="457200" y="1604520"/>
+            <a:ext cx="4015800" cy="1896840"/>
           </a:xfrm>
           <a:prstGeom prst="rect">
             <a:avLst/>
@@ -1207,7 +1218,7 @@
       </p:sp>
       <p:sp>
         <p:nvSpPr>
-          <p:cNvPr id="63" name="PlaceHolder 3"/>
+          <p:cNvPr id="57" name="PlaceHolder 3"/>
           <p:cNvSpPr>
             <a:spLocks noGrp="1"/>
           </p:cNvSpPr>
@@ -1217,8 +1228,8 @@
         </p:nvSpPr>
         <p:spPr>
           <a:xfrm>
-            <a:off x="4674240" y="1600200"/>
-            <a:ext cx="4015800" cy="2158560"/>
+            <a:off x="4674240" y="1604520"/>
+            <a:ext cx="4015800" cy="1896840"/>
           </a:xfrm>
           <a:prstGeom prst="rect">
             <a:avLst/>
@@ -1233,7 +1244,7 @@
       </p:sp>
       <p:sp>
         <p:nvSpPr>
-          <p:cNvPr id="64" name="PlaceHolder 4"/>
+          <p:cNvPr id="58" name="PlaceHolder 4"/>
           <p:cNvSpPr>
             <a:spLocks noGrp="1"/>
           </p:cNvSpPr>
@@ -1243,8 +1254,8 @@
         </p:nvSpPr>
         <p:spPr>
           <a:xfrm>
-            <a:off x="457200" y="3964320"/>
-            <a:ext cx="8229240" cy="2158560"/>
+            <a:off x="457200" y="3682080"/>
+            <a:ext cx="8229240" cy="1896840"/>
           </a:xfrm>
           <a:prstGeom prst="rect">
             <a:avLst/>
@@ -1281,7 +1292,7 @@
       </p:grpSpPr>
       <p:sp>
         <p:nvSpPr>
-          <p:cNvPr id="65" name="PlaceHolder 1"/>
+          <p:cNvPr id="59" name="PlaceHolder 1"/>
           <p:cNvSpPr>
             <a:spLocks noGrp="1"/>
           </p:cNvSpPr>
@@ -1291,8 +1302,8 @@
         </p:nvSpPr>
         <p:spPr>
           <a:xfrm>
-            <a:off x="457200" y="274680"/>
-            <a:ext cx="8229240" cy="1142640"/>
+            <a:off x="457200" y="273600"/>
+            <a:ext cx="8229240" cy="1144800"/>
           </a:xfrm>
           <a:prstGeom prst="rect">
             <a:avLst/>
@@ -1301,13 +1312,14 @@
         <p:txBody>
           <a:bodyPr lIns="0" rIns="0" tIns="0" bIns="0" anchor="ctr"/>
           <a:p>
-            <a:endParaRPr/>
-          </a:p>
-        </p:txBody>
-      </p:sp>
-      <p:sp>
-        <p:nvSpPr>
-          <p:cNvPr id="66" name="PlaceHolder 2"/>
+            <a:pPr algn="ctr"/>
+            <a:endParaRPr/>
+          </a:p>
+        </p:txBody>
+      </p:sp>
+      <p:sp>
+        <p:nvSpPr>
+          <p:cNvPr id="60" name="PlaceHolder 2"/>
           <p:cNvSpPr>
             <a:spLocks noGrp="1"/>
           </p:cNvSpPr>
@@ -1317,8 +1329,8 @@
         </p:nvSpPr>
         <p:spPr>
           <a:xfrm>
-            <a:off x="457200" y="1600200"/>
-            <a:ext cx="8229240" cy="2158560"/>
+            <a:off x="457200" y="1604520"/>
+            <a:ext cx="8229240" cy="1896840"/>
           </a:xfrm>
           <a:prstGeom prst="rect">
             <a:avLst/>
@@ -1333,7 +1345,7 @@
       </p:sp>
       <p:sp>
         <p:nvSpPr>
-          <p:cNvPr id="67" name="PlaceHolder 3"/>
+          <p:cNvPr id="61" name="PlaceHolder 3"/>
           <p:cNvSpPr>
             <a:spLocks noGrp="1"/>
           </p:cNvSpPr>
@@ -1343,8 +1355,8 @@
         </p:nvSpPr>
         <p:spPr>
           <a:xfrm>
-            <a:off x="457200" y="3964320"/>
-            <a:ext cx="8229240" cy="2158560"/>
+            <a:off x="457200" y="3682080"/>
+            <a:ext cx="8229240" cy="1896840"/>
           </a:xfrm>
           <a:prstGeom prst="rect">
             <a:avLst/>
@@ -1381,7 +1393,7 @@
       </p:grpSpPr>
       <p:sp>
         <p:nvSpPr>
-          <p:cNvPr id="68" name="PlaceHolder 1"/>
+          <p:cNvPr id="62" name="PlaceHolder 1"/>
           <p:cNvSpPr>
             <a:spLocks noGrp="1"/>
           </p:cNvSpPr>
@@ -1391,8 +1403,8 @@
         </p:nvSpPr>
         <p:spPr>
           <a:xfrm>
-            <a:off x="457200" y="274680"/>
-            <a:ext cx="8229240" cy="1142640"/>
+            <a:off x="457200" y="273600"/>
+            <a:ext cx="8229240" cy="1144800"/>
           </a:xfrm>
           <a:prstGeom prst="rect">
             <a:avLst/>
@@ -1401,13 +1413,14 @@
         <p:txBody>
           <a:bodyPr lIns="0" rIns="0" tIns="0" bIns="0" anchor="ctr"/>
           <a:p>
-            <a:endParaRPr/>
-          </a:p>
-        </p:txBody>
-      </p:sp>
-      <p:sp>
-        <p:nvSpPr>
-          <p:cNvPr id="69" name="PlaceHolder 2"/>
+            <a:pPr algn="ctr"/>
+            <a:endParaRPr/>
+          </a:p>
+        </p:txBody>
+      </p:sp>
+      <p:sp>
+        <p:nvSpPr>
+          <p:cNvPr id="63" name="PlaceHolder 2"/>
           <p:cNvSpPr>
             <a:spLocks noGrp="1"/>
           </p:cNvSpPr>
@@ -1417,8 +1430,8 @@
         </p:nvSpPr>
         <p:spPr>
           <a:xfrm>
-            <a:off x="457200" y="1600200"/>
-            <a:ext cx="4015800" cy="2158560"/>
+            <a:off x="457200" y="1604520"/>
+            <a:ext cx="4015800" cy="1896840"/>
           </a:xfrm>
           <a:prstGeom prst="rect">
             <a:avLst/>
@@ -1433,7 +1446,7 @@
       </p:sp>
       <p:sp>
         <p:nvSpPr>
-          <p:cNvPr id="70" name="PlaceHolder 3"/>
+          <p:cNvPr id="64" name="PlaceHolder 3"/>
           <p:cNvSpPr>
             <a:spLocks noGrp="1"/>
           </p:cNvSpPr>
@@ -1443,8 +1456,8 @@
         </p:nvSpPr>
         <p:spPr>
           <a:xfrm>
-            <a:off x="4674240" y="1600200"/>
-            <a:ext cx="4015800" cy="2158560"/>
+            <a:off x="4674240" y="1604520"/>
+            <a:ext cx="4015800" cy="1896840"/>
           </a:xfrm>
           <a:prstGeom prst="rect">
             <a:avLst/>
@@ -1459,7 +1472,7 @@
       </p:sp>
       <p:sp>
         <p:nvSpPr>
-          <p:cNvPr id="71" name="PlaceHolder 4"/>
+          <p:cNvPr id="65" name="PlaceHolder 4"/>
           <p:cNvSpPr>
             <a:spLocks noGrp="1"/>
           </p:cNvSpPr>
@@ -1469,8 +1482,8 @@
         </p:nvSpPr>
         <p:spPr>
           <a:xfrm>
-            <a:off x="4674240" y="3964320"/>
-            <a:ext cx="4015800" cy="2158560"/>
+            <a:off x="4674240" y="3682080"/>
+            <a:ext cx="4015800" cy="1896840"/>
           </a:xfrm>
           <a:prstGeom prst="rect">
             <a:avLst/>
@@ -1485,7 +1498,7 @@
       </p:sp>
       <p:sp>
         <p:nvSpPr>
-          <p:cNvPr id="72" name="PlaceHolder 5"/>
+          <p:cNvPr id="66" name="PlaceHolder 5"/>
           <p:cNvSpPr>
             <a:spLocks noGrp="1"/>
           </p:cNvSpPr>
@@ -1495,8 +1508,8 @@
         </p:nvSpPr>
         <p:spPr>
           <a:xfrm>
-            <a:off x="457200" y="3964320"/>
-            <a:ext cx="4015800" cy="2158560"/>
+            <a:off x="457200" y="3682080"/>
+            <a:ext cx="4015800" cy="1896840"/>
           </a:xfrm>
           <a:prstGeom prst="rect">
             <a:avLst/>
@@ -1533,7 +1546,7 @@
       </p:grpSpPr>
       <p:sp>
         <p:nvSpPr>
-          <p:cNvPr id="73" name="PlaceHolder 1"/>
+          <p:cNvPr id="67" name="PlaceHolder 1"/>
           <p:cNvSpPr>
             <a:spLocks noGrp="1"/>
           </p:cNvSpPr>
@@ -1543,8 +1556,8 @@
         </p:nvSpPr>
         <p:spPr>
           <a:xfrm>
-            <a:off x="457200" y="274680"/>
-            <a:ext cx="8229240" cy="1142640"/>
+            <a:off x="457200" y="273600"/>
+            <a:ext cx="8229240" cy="1144800"/>
           </a:xfrm>
           <a:prstGeom prst="rect">
             <a:avLst/>
@@ -1553,13 +1566,14 @@
         <p:txBody>
           <a:bodyPr lIns="0" rIns="0" tIns="0" bIns="0" anchor="ctr"/>
           <a:p>
-            <a:endParaRPr/>
-          </a:p>
-        </p:txBody>
-      </p:sp>
-      <p:sp>
-        <p:nvSpPr>
-          <p:cNvPr id="74" name="PlaceHolder 2"/>
+            <a:pPr algn="ctr"/>
+            <a:endParaRPr/>
+          </a:p>
+        </p:txBody>
+      </p:sp>
+      <p:sp>
+        <p:nvSpPr>
+          <p:cNvPr id="68" name="PlaceHolder 2"/>
           <p:cNvSpPr>
             <a:spLocks noGrp="1"/>
           </p:cNvSpPr>
@@ -1569,8 +1583,8 @@
         </p:nvSpPr>
         <p:spPr>
           <a:xfrm>
-            <a:off x="457200" y="1600200"/>
-            <a:ext cx="8229240" cy="4525560"/>
+            <a:off x="457200" y="1604520"/>
+            <a:ext cx="8229240" cy="3977280"/>
           </a:xfrm>
           <a:prstGeom prst="rect">
             <a:avLst/>
@@ -1585,7 +1599,7 @@
       </p:sp>
       <p:sp>
         <p:nvSpPr>
-          <p:cNvPr id="75" name="PlaceHolder 3"/>
+          <p:cNvPr id="69" name="PlaceHolder 3"/>
           <p:cNvSpPr>
             <a:spLocks noGrp="1"/>
           </p:cNvSpPr>
@@ -1595,8 +1609,8 @@
         </p:nvSpPr>
         <p:spPr>
           <a:xfrm>
-            <a:off x="457200" y="1600200"/>
-            <a:ext cx="8229240" cy="4525560"/>
+            <a:off x="457200" y="1604520"/>
+            <a:ext cx="8229240" cy="3977280"/>
           </a:xfrm>
           <a:prstGeom prst="rect">
             <a:avLst/>
@@ -1611,7 +1625,7 @@
       </p:sp>
       <p:pic>
         <p:nvPicPr>
-          <p:cNvPr id="76" name="" descr=""/>
+          <p:cNvPr id="70" name="" descr=""/>
           <p:cNvPicPr/>
           <p:nvPr/>
         </p:nvPicPr>
@@ -1621,8 +1635,8 @@
         </p:blipFill>
         <p:spPr>
           <a:xfrm>
-            <a:off x="1735560" y="1599840"/>
-            <a:ext cx="5671800" cy="4525560"/>
+            <a:off x="2079000" y="1604520"/>
+            <a:ext cx="4984920" cy="3977280"/>
           </a:xfrm>
           <a:prstGeom prst="rect">
             <a:avLst/>
@@ -1634,7 +1648,7 @@
       </p:pic>
       <p:pic>
         <p:nvPicPr>
-          <p:cNvPr id="77" name="" descr=""/>
+          <p:cNvPr id="71" name="" descr=""/>
           <p:cNvPicPr/>
           <p:nvPr/>
         </p:nvPicPr>
@@ -1644,8 +1658,8 @@
         </p:blipFill>
         <p:spPr>
           <a:xfrm>
-            <a:off x="1735560" y="1599840"/>
-            <a:ext cx="5671800" cy="4525560"/>
+            <a:off x="2079000" y="1604520"/>
+            <a:ext cx="4984920" cy="3977280"/>
           </a:xfrm>
           <a:prstGeom prst="rect">
             <a:avLst/>
@@ -1679,7 +1693,7 @@
       </p:grpSpPr>
       <p:sp>
         <p:nvSpPr>
-          <p:cNvPr id="7" name="PlaceHolder 1"/>
+          <p:cNvPr id="4" name="PlaceHolder 1"/>
           <p:cNvSpPr>
             <a:spLocks noGrp="1"/>
           </p:cNvSpPr>
@@ -1689,8 +1703,8 @@
         </p:nvSpPr>
         <p:spPr>
           <a:xfrm>
-            <a:off x="457200" y="274680"/>
-            <a:ext cx="8229240" cy="1142640"/>
+            <a:off x="457200" y="273600"/>
+            <a:ext cx="8229240" cy="1144800"/>
           </a:xfrm>
           <a:prstGeom prst="rect">
             <a:avLst/>
@@ -1699,13 +1713,14 @@
         <p:txBody>
           <a:bodyPr lIns="0" rIns="0" tIns="0" bIns="0" anchor="ctr"/>
           <a:p>
-            <a:endParaRPr/>
-          </a:p>
-        </p:txBody>
-      </p:sp>
-      <p:sp>
-        <p:nvSpPr>
-          <p:cNvPr id="8" name="PlaceHolder 2"/>
+            <a:pPr algn="ctr"/>
+            <a:endParaRPr/>
+          </a:p>
+        </p:txBody>
+      </p:sp>
+      <p:sp>
+        <p:nvSpPr>
+          <p:cNvPr id="5" name="PlaceHolder 2"/>
           <p:cNvSpPr>
             <a:spLocks noGrp="1"/>
           </p:cNvSpPr>
@@ -1715,8 +1730,8 @@
         </p:nvSpPr>
         <p:spPr>
           <a:xfrm>
-            <a:off x="457200" y="1600200"/>
-            <a:ext cx="8229240" cy="4525560"/>
+            <a:off x="457200" y="1604520"/>
+            <a:ext cx="8229240" cy="3977280"/>
           </a:xfrm>
           <a:prstGeom prst="rect">
             <a:avLst/>
@@ -1753,7 +1768,7 @@
       </p:grpSpPr>
       <p:sp>
         <p:nvSpPr>
-          <p:cNvPr id="9" name="PlaceHolder 1"/>
+          <p:cNvPr id="6" name="PlaceHolder 1"/>
           <p:cNvSpPr>
             <a:spLocks noGrp="1"/>
           </p:cNvSpPr>
@@ -1763,8 +1778,8 @@
         </p:nvSpPr>
         <p:spPr>
           <a:xfrm>
-            <a:off x="457200" y="274680"/>
-            <a:ext cx="8229240" cy="1142640"/>
+            <a:off x="457200" y="273600"/>
+            <a:ext cx="8229240" cy="1144800"/>
           </a:xfrm>
           <a:prstGeom prst="rect">
             <a:avLst/>
@@ -1773,13 +1788,14 @@
         <p:txBody>
           <a:bodyPr lIns="0" rIns="0" tIns="0" bIns="0" anchor="ctr"/>
           <a:p>
-            <a:endParaRPr/>
-          </a:p>
-        </p:txBody>
-      </p:sp>
-      <p:sp>
-        <p:nvSpPr>
-          <p:cNvPr id="10" name="PlaceHolder 2"/>
+            <a:pPr algn="ctr"/>
+            <a:endParaRPr/>
+          </a:p>
+        </p:txBody>
+      </p:sp>
+      <p:sp>
+        <p:nvSpPr>
+          <p:cNvPr id="7" name="PlaceHolder 2"/>
           <p:cNvSpPr>
             <a:spLocks noGrp="1"/>
           </p:cNvSpPr>
@@ -1789,8 +1805,8 @@
         </p:nvSpPr>
         <p:spPr>
           <a:xfrm>
-            <a:off x="457200" y="1600200"/>
-            <a:ext cx="4015800" cy="4525560"/>
+            <a:off x="457200" y="1604520"/>
+            <a:ext cx="4015800" cy="3977280"/>
           </a:xfrm>
           <a:prstGeom prst="rect">
             <a:avLst/>
@@ -1805,7 +1821,7 @@
       </p:sp>
       <p:sp>
         <p:nvSpPr>
-          <p:cNvPr id="11" name="PlaceHolder 3"/>
+          <p:cNvPr id="8" name="PlaceHolder 3"/>
           <p:cNvSpPr>
             <a:spLocks noGrp="1"/>
           </p:cNvSpPr>
@@ -1815,8 +1831,8 @@
         </p:nvSpPr>
         <p:spPr>
           <a:xfrm>
-            <a:off x="4674240" y="1600200"/>
-            <a:ext cx="4015800" cy="4525560"/>
+            <a:off x="4674240" y="1604520"/>
+            <a:ext cx="4015800" cy="3977280"/>
           </a:xfrm>
           <a:prstGeom prst="rect">
             <a:avLst/>
@@ -1853,7 +1869,7 @@
       </p:grpSpPr>
       <p:sp>
         <p:nvSpPr>
-          <p:cNvPr id="12" name="PlaceHolder 1"/>
+          <p:cNvPr id="9" name="PlaceHolder 1"/>
           <p:cNvSpPr>
             <a:spLocks noGrp="1"/>
           </p:cNvSpPr>
@@ -1863,8 +1879,8 @@
         </p:nvSpPr>
         <p:spPr>
           <a:xfrm>
-            <a:off x="457200" y="274680"/>
-            <a:ext cx="8229240" cy="1142640"/>
+            <a:off x="457200" y="273600"/>
+            <a:ext cx="8229240" cy="1144800"/>
           </a:xfrm>
           <a:prstGeom prst="rect">
             <a:avLst/>
@@ -1873,6 +1889,7 @@
         <p:txBody>
           <a:bodyPr lIns="0" rIns="0" tIns="0" bIns="0" anchor="ctr"/>
           <a:p>
+            <a:pPr algn="ctr"/>
             <a:endParaRPr/>
           </a:p>
         </p:txBody>
@@ -1901,7 +1918,7 @@
       </p:grpSpPr>
       <p:sp>
         <p:nvSpPr>
-          <p:cNvPr id="13" name="PlaceHolder 1"/>
+          <p:cNvPr id="10" name="PlaceHolder 1"/>
           <p:cNvSpPr>
             <a:spLocks noGrp="1"/>
           </p:cNvSpPr>
@@ -1911,8 +1928,8 @@
         </p:nvSpPr>
         <p:spPr>
           <a:xfrm>
-            <a:off x="457200" y="274680"/>
-            <a:ext cx="8229240" cy="5297760"/>
+            <a:off x="457200" y="273600"/>
+            <a:ext cx="8229240" cy="5307840"/>
           </a:xfrm>
           <a:prstGeom prst="rect">
             <a:avLst/>
@@ -1950,7 +1967,7 @@
       </p:grpSpPr>
       <p:sp>
         <p:nvSpPr>
-          <p:cNvPr id="14" name="PlaceHolder 1"/>
+          <p:cNvPr id="11" name="PlaceHolder 1"/>
           <p:cNvSpPr>
             <a:spLocks noGrp="1"/>
           </p:cNvSpPr>
@@ -1960,8 +1977,8 @@
         </p:nvSpPr>
         <p:spPr>
           <a:xfrm>
-            <a:off x="457200" y="274680"/>
-            <a:ext cx="8229240" cy="1142640"/>
+            <a:off x="457200" y="273600"/>
+            <a:ext cx="8229240" cy="1144800"/>
           </a:xfrm>
           <a:prstGeom prst="rect">
             <a:avLst/>
@@ -1970,13 +1987,14 @@
         <p:txBody>
           <a:bodyPr lIns="0" rIns="0" tIns="0" bIns="0" anchor="ctr"/>
           <a:p>
-            <a:endParaRPr/>
-          </a:p>
-        </p:txBody>
-      </p:sp>
-      <p:sp>
-        <p:nvSpPr>
-          <p:cNvPr id="15" name="PlaceHolder 2"/>
+            <a:pPr algn="ctr"/>
+            <a:endParaRPr/>
+          </a:p>
+        </p:txBody>
+      </p:sp>
+      <p:sp>
+        <p:nvSpPr>
+          <p:cNvPr id="12" name="PlaceHolder 2"/>
           <p:cNvSpPr>
             <a:spLocks noGrp="1"/>
           </p:cNvSpPr>
@@ -1986,8 +2004,8 @@
         </p:nvSpPr>
         <p:spPr>
           <a:xfrm>
-            <a:off x="457200" y="1600200"/>
-            <a:ext cx="4015800" cy="2158560"/>
+            <a:off x="457200" y="1604520"/>
+            <a:ext cx="4015800" cy="1896840"/>
           </a:xfrm>
           <a:prstGeom prst="rect">
             <a:avLst/>
@@ -2002,7 +2020,7 @@
       </p:sp>
       <p:sp>
         <p:nvSpPr>
-          <p:cNvPr id="16" name="PlaceHolder 3"/>
+          <p:cNvPr id="13" name="PlaceHolder 3"/>
           <p:cNvSpPr>
             <a:spLocks noGrp="1"/>
           </p:cNvSpPr>
@@ -2012,8 +2030,8 @@
         </p:nvSpPr>
         <p:spPr>
           <a:xfrm>
-            <a:off x="457200" y="3964320"/>
-            <a:ext cx="4015800" cy="2158560"/>
+            <a:off x="457200" y="3682080"/>
+            <a:ext cx="4015800" cy="1896840"/>
           </a:xfrm>
           <a:prstGeom prst="rect">
             <a:avLst/>
@@ -2028,7 +2046,7 @@
       </p:sp>
       <p:sp>
         <p:nvSpPr>
-          <p:cNvPr id="17" name="PlaceHolder 4"/>
+          <p:cNvPr id="14" name="PlaceHolder 4"/>
           <p:cNvSpPr>
             <a:spLocks noGrp="1"/>
           </p:cNvSpPr>
@@ -2038,8 +2056,8 @@
         </p:nvSpPr>
         <p:spPr>
           <a:xfrm>
-            <a:off x="4674240" y="1600200"/>
-            <a:ext cx="4015800" cy="4525560"/>
+            <a:off x="4674240" y="1604520"/>
+            <a:ext cx="4015800" cy="3977280"/>
           </a:xfrm>
           <a:prstGeom prst="rect">
             <a:avLst/>
@@ -2076,7 +2094,7 @@
       </p:grpSpPr>
       <p:sp>
         <p:nvSpPr>
-          <p:cNvPr id="18" name="PlaceHolder 1"/>
+          <p:cNvPr id="15" name="PlaceHolder 1"/>
           <p:cNvSpPr>
             <a:spLocks noGrp="1"/>
           </p:cNvSpPr>
@@ -2086,8 +2104,8 @@
         </p:nvSpPr>
         <p:spPr>
           <a:xfrm>
-            <a:off x="457200" y="274680"/>
-            <a:ext cx="8229240" cy="1142640"/>
+            <a:off x="457200" y="273600"/>
+            <a:ext cx="8229240" cy="1144800"/>
           </a:xfrm>
           <a:prstGeom prst="rect">
             <a:avLst/>
@@ -2096,13 +2114,14 @@
         <p:txBody>
           <a:bodyPr lIns="0" rIns="0" tIns="0" bIns="0" anchor="ctr"/>
           <a:p>
-            <a:endParaRPr/>
-          </a:p>
-        </p:txBody>
-      </p:sp>
-      <p:sp>
-        <p:nvSpPr>
-          <p:cNvPr id="19" name="PlaceHolder 2"/>
+            <a:pPr algn="ctr"/>
+            <a:endParaRPr/>
+          </a:p>
+        </p:txBody>
+      </p:sp>
+      <p:sp>
+        <p:nvSpPr>
+          <p:cNvPr id="16" name="PlaceHolder 2"/>
           <p:cNvSpPr>
             <a:spLocks noGrp="1"/>
           </p:cNvSpPr>
@@ -2112,8 +2131,8 @@
         </p:nvSpPr>
         <p:spPr>
           <a:xfrm>
-            <a:off x="457200" y="1600200"/>
-            <a:ext cx="4015800" cy="4525560"/>
+            <a:off x="457200" y="1604520"/>
+            <a:ext cx="4015800" cy="3977280"/>
           </a:xfrm>
           <a:prstGeom prst="rect">
             <a:avLst/>
@@ -2128,7 +2147,7 @@
       </p:sp>
       <p:sp>
         <p:nvSpPr>
-          <p:cNvPr id="20" name="PlaceHolder 3"/>
+          <p:cNvPr id="17" name="PlaceHolder 3"/>
           <p:cNvSpPr>
             <a:spLocks noGrp="1"/>
           </p:cNvSpPr>
@@ -2138,8 +2157,8 @@
         </p:nvSpPr>
         <p:spPr>
           <a:xfrm>
-            <a:off x="4674240" y="1600200"/>
-            <a:ext cx="4015800" cy="2158560"/>
+            <a:off x="4674240" y="1604520"/>
+            <a:ext cx="4015800" cy="1896840"/>
           </a:xfrm>
           <a:prstGeom prst="rect">
             <a:avLst/>
@@ -2154,7 +2173,7 @@
       </p:sp>
       <p:sp>
         <p:nvSpPr>
-          <p:cNvPr id="21" name="PlaceHolder 4"/>
+          <p:cNvPr id="18" name="PlaceHolder 4"/>
           <p:cNvSpPr>
             <a:spLocks noGrp="1"/>
           </p:cNvSpPr>
@@ -2164,8 +2183,8 @@
         </p:nvSpPr>
         <p:spPr>
           <a:xfrm>
-            <a:off x="4674240" y="3964320"/>
-            <a:ext cx="4015800" cy="2158560"/>
+            <a:off x="4674240" y="3682080"/>
+            <a:ext cx="4015800" cy="1896840"/>
           </a:xfrm>
           <a:prstGeom prst="rect">
             <a:avLst/>
@@ -2202,7 +2221,7 @@
       </p:grpSpPr>
       <p:sp>
         <p:nvSpPr>
-          <p:cNvPr id="22" name="PlaceHolder 1"/>
+          <p:cNvPr id="19" name="PlaceHolder 1"/>
           <p:cNvSpPr>
             <a:spLocks noGrp="1"/>
           </p:cNvSpPr>
@@ -2212,8 +2231,8 @@
         </p:nvSpPr>
         <p:spPr>
           <a:xfrm>
-            <a:off x="457200" y="274680"/>
-            <a:ext cx="8229240" cy="1142640"/>
+            <a:off x="457200" y="273600"/>
+            <a:ext cx="8229240" cy="1144800"/>
           </a:xfrm>
           <a:prstGeom prst="rect">
             <a:avLst/>
@@ -2222,13 +2241,14 @@
         <p:txBody>
           <a:bodyPr lIns="0" rIns="0" tIns="0" bIns="0" anchor="ctr"/>
           <a:p>
-            <a:endParaRPr/>
-          </a:p>
-        </p:txBody>
-      </p:sp>
-      <p:sp>
-        <p:nvSpPr>
-          <p:cNvPr id="23" name="PlaceHolder 2"/>
+            <a:pPr algn="ctr"/>
+            <a:endParaRPr/>
+          </a:p>
+        </p:txBody>
+      </p:sp>
+      <p:sp>
+        <p:nvSpPr>
+          <p:cNvPr id="20" name="PlaceHolder 2"/>
           <p:cNvSpPr>
             <a:spLocks noGrp="1"/>
           </p:cNvSpPr>
@@ -2238,8 +2258,8 @@
         </p:nvSpPr>
         <p:spPr>
           <a:xfrm>
-            <a:off x="457200" y="1600200"/>
-            <a:ext cx="4015800" cy="2158560"/>
+            <a:off x="457200" y="1604520"/>
+            <a:ext cx="4015800" cy="1896840"/>
           </a:xfrm>
           <a:prstGeom prst="rect">
             <a:avLst/>
@@ -2254,7 +2274,7 @@
       </p:sp>
       <p:sp>
         <p:nvSpPr>
-          <p:cNvPr id="24" name="PlaceHolder 3"/>
+          <p:cNvPr id="21" name="PlaceHolder 3"/>
           <p:cNvSpPr>
             <a:spLocks noGrp="1"/>
           </p:cNvSpPr>
@@ -2264,8 +2284,8 @@
         </p:nvSpPr>
         <p:spPr>
           <a:xfrm>
-            <a:off x="4674240" y="1600200"/>
-            <a:ext cx="4015800" cy="2158560"/>
+            <a:off x="4674240" y="1604520"/>
+            <a:ext cx="4015800" cy="1896840"/>
           </a:xfrm>
           <a:prstGeom prst="rect">
             <a:avLst/>
@@ -2280,7 +2300,7 @@
       </p:sp>
       <p:sp>
         <p:nvSpPr>
-          <p:cNvPr id="25" name="PlaceHolder 4"/>
+          <p:cNvPr id="22" name="PlaceHolder 4"/>
           <p:cNvSpPr>
             <a:spLocks noGrp="1"/>
           </p:cNvSpPr>
@@ -2290,8 +2310,8 @@
         </p:nvSpPr>
         <p:spPr>
           <a:xfrm>
-            <a:off x="457200" y="3964320"/>
-            <a:ext cx="8229240" cy="2158560"/>
+            <a:off x="457200" y="3682080"/>
+            <a:ext cx="8229240" cy="1896840"/>
           </a:xfrm>
           <a:prstGeom prst="rect">
             <a:avLst/>
@@ -2348,29 +2368,21 @@
         </p:nvSpPr>
         <p:spPr>
           <a:xfrm>
-            <a:off x="685800" y="2130480"/>
-            <a:ext cx="7772040" cy="1469520"/>
-          </a:xfrm>
-          <a:prstGeom prst="rect">
-            <a:avLst/>
-          </a:prstGeom>
-        </p:spPr>
-        <p:txBody>
-          <a:bodyPr anchor="ctr"/>
-          <a:p>
-            <a:pPr algn="ctr">
-              <a:lnSpc>
-                <a:spcPct val="100000"/>
-              </a:lnSpc>
-            </a:pPr>
+            <a:off x="457200" y="274680"/>
+            <a:ext cx="8228880" cy="1142280"/>
+          </a:xfrm>
+          <a:prstGeom prst="rect">
+            <a:avLst/>
+          </a:prstGeom>
+        </p:spPr>
+        <p:txBody>
+          <a:bodyPr lIns="0" rIns="0" tIns="0" bIns="0" anchor="ctr"/>
+          <a:p>
             <a:r>
-              <a:rPr lang="bg-BG" sz="4400" strike="noStrike">
-                <a:solidFill>
-                  <a:srgbClr val="000000"/>
-                </a:solidFill>
-                <a:latin typeface="Calibri"/>
+              <a:rPr lang="en-US">
+                <a:latin typeface="Arial"/>
               </a:rPr>
-              <a:t>Click to edit the title text formatClick to edit Master title style</a:t>
+              <a:t>Click to edit the title text format</a:t>
             </a:r>
             <a:endParaRPr/>
           </a:p>
@@ -2379,112 +2391,6 @@
       <p:sp>
         <p:nvSpPr>
           <p:cNvPr id="1" name="PlaceHolder 2"/>
-          <p:cNvSpPr>
-            <a:spLocks noGrp="1"/>
-          </p:cNvSpPr>
-          <p:nvPr>
-            <p:ph type="dt"/>
-          </p:nvPr>
-        </p:nvSpPr>
-        <p:spPr>
-          <a:xfrm>
-            <a:off x="457200" y="6356520"/>
-            <a:ext cx="2133360" cy="364680"/>
-          </a:xfrm>
-          <a:prstGeom prst="rect">
-            <a:avLst/>
-          </a:prstGeom>
-        </p:spPr>
-        <p:txBody>
-          <a:bodyPr anchor="ctr"/>
-          <a:p>
-            <a:pPr>
-              <a:lnSpc>
-                <a:spcPct val="100000"/>
-              </a:lnSpc>
-            </a:pPr>
-            <a:r>
-              <a:rPr lang="en-US" sz="1200" strike="noStrike">
-                <a:solidFill>
-                  <a:srgbClr val="8b8b8b"/>
-                </a:solidFill>
-                <a:latin typeface="Calibri"/>
-              </a:rPr>
-              <a:t>4/27/15</a:t>
-            </a:r>
-            <a:endParaRPr/>
-          </a:p>
-        </p:txBody>
-      </p:sp>
-      <p:sp>
-        <p:nvSpPr>
-          <p:cNvPr id="2" name="PlaceHolder 3"/>
-          <p:cNvSpPr>
-            <a:spLocks noGrp="1"/>
-          </p:cNvSpPr>
-          <p:nvPr>
-            <p:ph type="ftr"/>
-          </p:nvPr>
-        </p:nvSpPr>
-        <p:spPr>
-          <a:xfrm>
-            <a:off x="3124080" y="6356520"/>
-            <a:ext cx="2895120" cy="364680"/>
-          </a:xfrm>
-          <a:prstGeom prst="rect">
-            <a:avLst/>
-          </a:prstGeom>
-        </p:spPr>
-        <p:txBody>
-          <a:bodyPr anchor="ctr"/>
-          <a:p>
-            <a:endParaRPr/>
-          </a:p>
-        </p:txBody>
-      </p:sp>
-      <p:sp>
-        <p:nvSpPr>
-          <p:cNvPr id="3" name="PlaceHolder 4"/>
-          <p:cNvSpPr>
-            <a:spLocks noGrp="1"/>
-          </p:cNvSpPr>
-          <p:nvPr>
-            <p:ph type="sldNum"/>
-          </p:nvPr>
-        </p:nvSpPr>
-        <p:spPr>
-          <a:xfrm>
-            <a:off x="6553080" y="6356520"/>
-            <a:ext cx="2133360" cy="364680"/>
-          </a:xfrm>
-          <a:prstGeom prst="rect">
-            <a:avLst/>
-          </a:prstGeom>
-        </p:spPr>
-        <p:txBody>
-          <a:bodyPr anchor="ctr"/>
-          <a:p>
-            <a:pPr algn="r">
-              <a:lnSpc>
-                <a:spcPct val="100000"/>
-              </a:lnSpc>
-            </a:pPr>
-            <a:fld id="{31B46C48-017E-43E8-9C64-0BE1651F1FF6}" type="slidenum">
-              <a:rPr lang="en-US" sz="1200" strike="noStrike">
-                <a:solidFill>
-                  <a:srgbClr val="8b8b8b"/>
-                </a:solidFill>
-                <a:latin typeface="Calibri"/>
-              </a:rPr>
-              <a:t>&lt;number&gt;</a:t>
-            </a:fld>
-            <a:endParaRPr/>
-          </a:p>
-        </p:txBody>
-      </p:sp>
-      <p:sp>
-        <p:nvSpPr>
-          <p:cNvPr id="4" name="PlaceHolder 5"/>
           <p:cNvSpPr>
             <a:spLocks noGrp="1"/>
           </p:cNvSpPr>
@@ -2510,8 +2416,8 @@
               <a:buChar char=""/>
             </a:pPr>
             <a:r>
-              <a:rPr lang="bg-BG" sz="3200">
-                <a:latin typeface="Calibri"/>
+              <a:rPr lang="en-US" sz="3200">
+                <a:latin typeface="Arial"/>
               </a:rPr>
               <a:t>Click to edit the outline text format</a:t>
             </a:r>
@@ -2524,8 +2430,8 @@
               <a:buChar char=""/>
             </a:pPr>
             <a:r>
-              <a:rPr lang="bg-BG" sz="2400">
-                <a:latin typeface="Calibri"/>
+              <a:rPr lang="en-US" sz="2800">
+                <a:latin typeface="Arial"/>
               </a:rPr>
               <a:t>Second Outline Level</a:t>
             </a:r>
@@ -2538,8 +2444,8 @@
               <a:buChar char=""/>
             </a:pPr>
             <a:r>
-              <a:rPr lang="bg-BG" sz="2000">
-                <a:latin typeface="Calibri"/>
+              <a:rPr lang="en-US" sz="2400">
+                <a:latin typeface="Arial"/>
               </a:rPr>
               <a:t>Third Outline Level</a:t>
             </a:r>
@@ -2552,8 +2458,8 @@
               <a:buChar char=""/>
             </a:pPr>
             <a:r>
-              <a:rPr lang="bg-BG" sz="2000">
-                <a:latin typeface="Calibri"/>
+              <a:rPr lang="en-US" sz="2000">
+                <a:latin typeface="Arial"/>
               </a:rPr>
               <a:t>Fourth Outline Level</a:t>
             </a:r>
@@ -2566,8 +2472,8 @@
               <a:buChar char=""/>
             </a:pPr>
             <a:r>
-              <a:rPr lang="bg-BG" sz="2000">
-                <a:latin typeface="Calibri"/>
+              <a:rPr lang="en-US" sz="2000">
+                <a:latin typeface="Arial"/>
               </a:rPr>
               <a:t>Fifth Outline Level</a:t>
             </a:r>
@@ -2580,8 +2486,8 @@
               <a:buChar char=""/>
             </a:pPr>
             <a:r>
-              <a:rPr lang="bg-BG" sz="2000">
-                <a:latin typeface="Calibri"/>
+              <a:rPr lang="en-US" sz="2000">
+                <a:latin typeface="Arial"/>
               </a:rPr>
               <a:t>Sixth Outline Level</a:t>
             </a:r>
@@ -2594,8 +2500,8 @@
               <a:buChar char=""/>
             </a:pPr>
             <a:r>
-              <a:rPr lang="bg-BG" sz="2000">
-                <a:latin typeface="Calibri"/>
+              <a:rPr lang="en-US" sz="2000">
+                <a:latin typeface="Arial"/>
               </a:rPr>
               <a:t>Seventh Outline Level</a:t>
             </a:r>
@@ -2652,7 +2558,7 @@
       </p:grpSpPr>
       <p:sp>
         <p:nvSpPr>
-          <p:cNvPr id="39" name="PlaceHolder 1"/>
+          <p:cNvPr id="36" name="PlaceHolder 1"/>
           <p:cNvSpPr>
             <a:spLocks noGrp="1"/>
           </p:cNvSpPr>
@@ -2662,29 +2568,22 @@
         </p:nvSpPr>
         <p:spPr>
           <a:xfrm>
-            <a:off x="457200" y="274680"/>
-            <a:ext cx="8229240" cy="1142640"/>
-          </a:xfrm>
-          <a:prstGeom prst="rect">
-            <a:avLst/>
-          </a:prstGeom>
-        </p:spPr>
-        <p:txBody>
-          <a:bodyPr anchor="ctr"/>
-          <a:p>
-            <a:pPr algn="ctr">
-              <a:lnSpc>
-                <a:spcPct val="100000"/>
-              </a:lnSpc>
-            </a:pPr>
+            <a:off x="457200" y="273600"/>
+            <a:ext cx="8229240" cy="1144800"/>
+          </a:xfrm>
+          <a:prstGeom prst="rect">
+            <a:avLst/>
+          </a:prstGeom>
+        </p:spPr>
+        <p:txBody>
+          <a:bodyPr lIns="0" rIns="0" tIns="0" bIns="0" anchor="ctr"/>
+          <a:p>
+            <a:pPr algn="ctr"/>
             <a:r>
-              <a:rPr lang="bg-BG" sz="4400" strike="noStrike">
-                <a:solidFill>
-                  <a:srgbClr val="000000"/>
-                </a:solidFill>
-                <a:latin typeface="Calibri"/>
+              <a:rPr lang="en-US" sz="4400">
+                <a:latin typeface="Arial"/>
               </a:rPr>
-              <a:t>Click to edit the title text formatClick to edit Master title style</a:t>
+              <a:t>Click to edit the title text format</a:t>
             </a:r>
             <a:endParaRPr/>
           </a:p>
@@ -2692,7 +2591,7 @@
       </p:sp>
       <p:sp>
         <p:nvSpPr>
-          <p:cNvPr id="40" name="PlaceHolder 2"/>
+          <p:cNvPr id="37" name="PlaceHolder 2"/>
           <p:cNvSpPr>
             <a:spLocks noGrp="1"/>
           </p:cNvSpPr>
@@ -2702,15 +2601,15 @@
         </p:nvSpPr>
         <p:spPr>
           <a:xfrm>
-            <a:off x="457200" y="1600200"/>
-            <a:ext cx="8229240" cy="4525560"/>
-          </a:xfrm>
-          <a:prstGeom prst="rect">
-            <a:avLst/>
-          </a:prstGeom>
-        </p:spPr>
-        <p:txBody>
-          <a:bodyPr/>
+            <a:off x="457200" y="1604520"/>
+            <a:ext cx="8229240" cy="3977280"/>
+          </a:xfrm>
+          <a:prstGeom prst="rect">
+            <a:avLst/>
+          </a:prstGeom>
+        </p:spPr>
+        <p:txBody>
+          <a:bodyPr lIns="0" rIns="0" tIns="0" bIns="0"/>
           <a:p>
             <a:pPr>
               <a:buSzPct val="45000"/>
@@ -2718,11 +2617,8 @@
               <a:buChar char=""/>
             </a:pPr>
             <a:r>
-              <a:rPr lang="bg-BG" sz="3200" strike="noStrike">
-                <a:solidFill>
-                  <a:srgbClr val="000000"/>
-                </a:solidFill>
-                <a:latin typeface="Calibri"/>
+              <a:rPr lang="en-US" sz="3200">
+                <a:latin typeface="Arial"/>
               </a:rPr>
               <a:t>Click to edit the outline text format</a:t>
             </a:r>
@@ -2735,11 +2631,8 @@
               <a:buChar char=""/>
             </a:pPr>
             <a:r>
-              <a:rPr lang="bg-BG" sz="3200" strike="noStrike">
-                <a:solidFill>
-                  <a:srgbClr val="000000"/>
-                </a:solidFill>
-                <a:latin typeface="Calibri"/>
+              <a:rPr lang="en-US" sz="2800">
+                <a:latin typeface="Arial"/>
               </a:rPr>
               <a:t>Second Outline Level</a:t>
             </a:r>
@@ -2752,11 +2645,8 @@
               <a:buChar char=""/>
             </a:pPr>
             <a:r>
-              <a:rPr lang="bg-BG" sz="3200" strike="noStrike">
-                <a:solidFill>
-                  <a:srgbClr val="000000"/>
-                </a:solidFill>
-                <a:latin typeface="Calibri"/>
+              <a:rPr lang="en-US" sz="2400">
+                <a:latin typeface="Arial"/>
               </a:rPr>
               <a:t>Third Outline Level</a:t>
             </a:r>
@@ -2769,11 +2659,8 @@
               <a:buChar char=""/>
             </a:pPr>
             <a:r>
-              <a:rPr lang="bg-BG" sz="3200" strike="noStrike">
-                <a:solidFill>
-                  <a:srgbClr val="000000"/>
-                </a:solidFill>
-                <a:latin typeface="Calibri"/>
+              <a:rPr lang="en-US" sz="2000">
+                <a:latin typeface="Arial"/>
               </a:rPr>
               <a:t>Fourth Outline Level</a:t>
             </a:r>
@@ -2786,11 +2673,8 @@
               <a:buChar char=""/>
             </a:pPr>
             <a:r>
-              <a:rPr lang="bg-BG" sz="3200" strike="noStrike">
-                <a:solidFill>
-                  <a:srgbClr val="000000"/>
-                </a:solidFill>
-                <a:latin typeface="Calibri"/>
+              <a:rPr lang="en-US" sz="2000">
+                <a:latin typeface="Arial"/>
               </a:rPr>
               <a:t>Fifth Outline Level</a:t>
             </a:r>
@@ -2803,215 +2687,25 @@
               <a:buChar char=""/>
             </a:pPr>
             <a:r>
-              <a:rPr lang="bg-BG" sz="3200" strike="noStrike">
-                <a:solidFill>
-                  <a:srgbClr val="000000"/>
-                </a:solidFill>
-                <a:latin typeface="Calibri"/>
+              <a:rPr lang="en-US" sz="2000">
+                <a:latin typeface="Arial"/>
               </a:rPr>
               <a:t>Sixth Outline Level</a:t>
             </a:r>
             <a:endParaRPr/>
           </a:p>
           <a:p>
-            <a:pPr>
-              <a:lnSpc>
-                <a:spcPct val="100000"/>
-              </a:lnSpc>
-              <a:buFont typeface="Arial"/>
-              <a:buChar char="•"/>
+            <a:pPr lvl="6">
+              <a:buSzPct val="45000"/>
+              <a:buFont typeface="StarSymbol"/>
+              <a:buChar char=""/>
             </a:pPr>
             <a:r>
-              <a:rPr lang="bg-BG" sz="3200" strike="noStrike">
-                <a:solidFill>
-                  <a:srgbClr val="000000"/>
-                </a:solidFill>
-                <a:latin typeface="Calibri"/>
+              <a:rPr lang="en-US" sz="2000">
+                <a:latin typeface="Arial"/>
               </a:rPr>
-              <a:t>Seventh Outline LevelClick to edit Master text styles</a:t>
+              <a:t>Seventh Outline Level</a:t>
             </a:r>
-            <a:endParaRPr/>
-          </a:p>
-          <a:p>
-            <a:pPr lvl="1">
-              <a:lnSpc>
-                <a:spcPct val="100000"/>
-              </a:lnSpc>
-              <a:buFont typeface="Arial"/>
-              <a:buChar char="–"/>
-            </a:pPr>
-            <a:r>
-              <a:rPr lang="bg-BG" sz="2800" strike="noStrike">
-                <a:solidFill>
-                  <a:srgbClr val="000000"/>
-                </a:solidFill>
-                <a:latin typeface="Calibri"/>
-              </a:rPr>
-              <a:t>Second level</a:t>
-            </a:r>
-            <a:endParaRPr/>
-          </a:p>
-          <a:p>
-            <a:pPr lvl="2">
-              <a:lnSpc>
-                <a:spcPct val="100000"/>
-              </a:lnSpc>
-              <a:buFont typeface="Arial"/>
-              <a:buChar char="•"/>
-            </a:pPr>
-            <a:r>
-              <a:rPr lang="bg-BG" sz="2400" strike="noStrike">
-                <a:solidFill>
-                  <a:srgbClr val="000000"/>
-                </a:solidFill>
-                <a:latin typeface="Calibri"/>
-              </a:rPr>
-              <a:t>Third level</a:t>
-            </a:r>
-            <a:endParaRPr/>
-          </a:p>
-          <a:p>
-            <a:pPr lvl="3">
-              <a:lnSpc>
-                <a:spcPct val="100000"/>
-              </a:lnSpc>
-              <a:buFont typeface="Arial"/>
-              <a:buChar char="–"/>
-            </a:pPr>
-            <a:r>
-              <a:rPr lang="bg-BG" sz="2000" strike="noStrike">
-                <a:solidFill>
-                  <a:srgbClr val="000000"/>
-                </a:solidFill>
-                <a:latin typeface="Calibri"/>
-              </a:rPr>
-              <a:t>Fourth level</a:t>
-            </a:r>
-            <a:endParaRPr/>
-          </a:p>
-          <a:p>
-            <a:pPr lvl="4">
-              <a:lnSpc>
-                <a:spcPct val="100000"/>
-              </a:lnSpc>
-              <a:buFont typeface="Arial"/>
-              <a:buChar char="»"/>
-            </a:pPr>
-            <a:r>
-              <a:rPr lang="bg-BG" sz="2000" strike="noStrike">
-                <a:solidFill>
-                  <a:srgbClr val="000000"/>
-                </a:solidFill>
-                <a:latin typeface="Calibri"/>
-              </a:rPr>
-              <a:t>Fifth level</a:t>
-            </a:r>
-            <a:endParaRPr/>
-          </a:p>
-        </p:txBody>
-      </p:sp>
-      <p:sp>
-        <p:nvSpPr>
-          <p:cNvPr id="41" name="PlaceHolder 3"/>
-          <p:cNvSpPr>
-            <a:spLocks noGrp="1"/>
-          </p:cNvSpPr>
-          <p:nvPr>
-            <p:ph type="dt"/>
-          </p:nvPr>
-        </p:nvSpPr>
-        <p:spPr>
-          <a:xfrm>
-            <a:off x="457200" y="6356520"/>
-            <a:ext cx="2133360" cy="364680"/>
-          </a:xfrm>
-          <a:prstGeom prst="rect">
-            <a:avLst/>
-          </a:prstGeom>
-        </p:spPr>
-        <p:txBody>
-          <a:bodyPr anchor="ctr"/>
-          <a:p>
-            <a:pPr>
-              <a:lnSpc>
-                <a:spcPct val="100000"/>
-              </a:lnSpc>
-            </a:pPr>
-            <a:r>
-              <a:rPr lang="en-US" sz="1200" strike="noStrike">
-                <a:solidFill>
-                  <a:srgbClr val="8b8b8b"/>
-                </a:solidFill>
-                <a:latin typeface="Calibri"/>
-              </a:rPr>
-              <a:t>4/27/15</a:t>
-            </a:r>
-            <a:endParaRPr/>
-          </a:p>
-        </p:txBody>
-      </p:sp>
-      <p:sp>
-        <p:nvSpPr>
-          <p:cNvPr id="42" name="PlaceHolder 4"/>
-          <p:cNvSpPr>
-            <a:spLocks noGrp="1"/>
-          </p:cNvSpPr>
-          <p:nvPr>
-            <p:ph type="ftr"/>
-          </p:nvPr>
-        </p:nvSpPr>
-        <p:spPr>
-          <a:xfrm>
-            <a:off x="3124080" y="6356520"/>
-            <a:ext cx="2895120" cy="364680"/>
-          </a:xfrm>
-          <a:prstGeom prst="rect">
-            <a:avLst/>
-          </a:prstGeom>
-        </p:spPr>
-        <p:txBody>
-          <a:bodyPr anchor="ctr"/>
-          <a:p>
-            <a:endParaRPr/>
-          </a:p>
-        </p:txBody>
-      </p:sp>
-      <p:sp>
-        <p:nvSpPr>
-          <p:cNvPr id="43" name="PlaceHolder 5"/>
-          <p:cNvSpPr>
-            <a:spLocks noGrp="1"/>
-          </p:cNvSpPr>
-          <p:nvPr>
-            <p:ph type="sldNum"/>
-          </p:nvPr>
-        </p:nvSpPr>
-        <p:spPr>
-          <a:xfrm>
-            <a:off x="6553080" y="6356520"/>
-            <a:ext cx="2133360" cy="364680"/>
-          </a:xfrm>
-          <a:prstGeom prst="rect">
-            <a:avLst/>
-          </a:prstGeom>
-        </p:spPr>
-        <p:txBody>
-          <a:bodyPr anchor="ctr"/>
-          <a:p>
-            <a:pPr algn="r">
-              <a:lnSpc>
-                <a:spcPct val="100000"/>
-              </a:lnSpc>
-            </a:pPr>
-            <a:fld id="{D0C25E03-E911-4039-8DD5-B7C24403845C}" type="slidenum">
-              <a:rPr lang="en-US" sz="1200" strike="noStrike">
-                <a:solidFill>
-                  <a:srgbClr val="8b8b8b"/>
-                </a:solidFill>
-                <a:latin typeface="Calibri"/>
-              </a:rPr>
-              <a:t>&lt;number&gt;</a:t>
-            </a:fld>
             <a:endParaRPr/>
           </a:p>
         </p:txBody>
@@ -3055,14 +2749,14 @@
       </p:grpSpPr>
       <p:sp>
         <p:nvSpPr>
-          <p:cNvPr id="78" name="TextShape 1"/>
-          <p:cNvSpPr txBox="1"/>
+          <p:cNvPr id="72" name="CustomShape 1"/>
+          <p:cNvSpPr/>
           <p:nvPr/>
         </p:nvSpPr>
         <p:spPr>
           <a:xfrm>
             <a:off x="685800" y="2130480"/>
-            <a:ext cx="7772040" cy="1469520"/>
+            <a:ext cx="7771680" cy="1469160"/>
           </a:xfrm>
           <a:prstGeom prst="rect">
             <a:avLst/>
@@ -3072,8 +2766,14 @@
             <a:noFill/>
           </a:ln>
         </p:spPr>
-        <p:txBody>
-          <a:bodyPr anchor="ctr"/>
+        <p:style>
+          <a:lnRef idx="0"/>
+          <a:fillRef idx="0"/>
+          <a:effectRef idx="0"/>
+          <a:fontRef idx="minor"/>
+        </p:style>
+        <p:txBody>
+          <a:bodyPr lIns="90000" rIns="90000" tIns="45000" bIns="45000" anchor="ctr"/>
           <a:p>
             <a:pPr algn="ctr">
               <a:lnSpc>
@@ -3081,7 +2781,7 @@
               </a:lnSpc>
             </a:pPr>
             <a:r>
-              <a:rPr lang="bg-BG" sz="4400" strike="noStrike">
+              <a:rPr lang="en-US" sz="4400" strike="noStrike">
                 <a:solidFill>
                   <a:srgbClr val="f79646"/>
                 </a:solidFill>
@@ -3095,14 +2795,14 @@
       </p:sp>
       <p:sp>
         <p:nvSpPr>
-          <p:cNvPr id="79" name="TextShape 2"/>
-          <p:cNvSpPr txBox="1"/>
+          <p:cNvPr id="73" name="CustomShape 2"/>
+          <p:cNvSpPr/>
           <p:nvPr/>
         </p:nvSpPr>
         <p:spPr>
           <a:xfrm>
             <a:off x="1371600" y="3886200"/>
-            <a:ext cx="6400440" cy="1752120"/>
+            <a:ext cx="6400080" cy="1751760"/>
           </a:xfrm>
           <a:prstGeom prst="rect">
             <a:avLst/>
@@ -3112,8 +2812,14 @@
             <a:noFill/>
           </a:ln>
         </p:spPr>
-        <p:txBody>
-          <a:bodyPr/>
+        <p:style>
+          <a:lnRef idx="0"/>
+          <a:fillRef idx="0"/>
+          <a:effectRef idx="0"/>
+          <a:fontRef idx="minor"/>
+        </p:style>
+        <p:txBody>
+          <a:bodyPr lIns="90000" rIns="90000" tIns="45000" bIns="45000"/>
           <a:p>
             <a:pPr algn="ctr">
               <a:lnSpc>
@@ -3192,14 +2898,14 @@
       </p:grpSpPr>
       <p:sp>
         <p:nvSpPr>
-          <p:cNvPr id="80" name="TextShape 1"/>
-          <p:cNvSpPr txBox="1"/>
+          <p:cNvPr id="74" name="CustomShape 1"/>
+          <p:cNvSpPr/>
           <p:nvPr/>
         </p:nvSpPr>
         <p:spPr>
           <a:xfrm>
             <a:off x="838080" y="685800"/>
-            <a:ext cx="8229240" cy="1142640"/>
+            <a:ext cx="8228880" cy="1142280"/>
           </a:xfrm>
           <a:prstGeom prst="rect">
             <a:avLst/>
@@ -3209,8 +2915,14 @@
             <a:noFill/>
           </a:ln>
         </p:spPr>
-        <p:txBody>
-          <a:bodyPr anchor="ctr"/>
+        <p:style>
+          <a:lnRef idx="0"/>
+          <a:fillRef idx="0"/>
+          <a:effectRef idx="0"/>
+          <a:fontRef idx="minor"/>
+        </p:style>
+        <p:txBody>
+          <a:bodyPr lIns="90000" rIns="90000" tIns="45000" bIns="45000" anchor="ctr"/>
           <a:p>
             <a:pPr>
               <a:lnSpc>
@@ -3218,7 +2930,7 @@
               </a:lnSpc>
             </a:pPr>
             <a:r>
-              <a:rPr lang="bg-BG" sz="4400" strike="noStrike">
+              <a:rPr lang="en-US" sz="4400" strike="noStrike">
                 <a:solidFill>
                   <a:srgbClr val="f79646"/>
                 </a:solidFill>
@@ -3232,14 +2944,14 @@
       </p:sp>
       <p:sp>
         <p:nvSpPr>
-          <p:cNvPr id="81" name="TextShape 2"/>
-          <p:cNvSpPr txBox="1"/>
+          <p:cNvPr id="75" name="CustomShape 2"/>
+          <p:cNvSpPr/>
           <p:nvPr/>
         </p:nvSpPr>
         <p:spPr>
           <a:xfrm>
             <a:off x="762120" y="1676520"/>
-            <a:ext cx="7848360" cy="4525560"/>
+            <a:ext cx="7848000" cy="4525200"/>
           </a:xfrm>
           <a:prstGeom prst="rect">
             <a:avLst/>
@@ -3249,8 +2961,14 @@
             <a:noFill/>
           </a:ln>
         </p:spPr>
-        <p:txBody>
-          <a:bodyPr/>
+        <p:style>
+          <a:lnRef idx="0"/>
+          <a:fillRef idx="0"/>
+          <a:effectRef idx="0"/>
+          <a:fontRef idx="minor"/>
+        </p:style>
+        <p:txBody>
+          <a:bodyPr lIns="90000" rIns="90000" tIns="45000" bIns="45000"/>
           <a:p>
             <a:pPr>
               <a:lnSpc>
@@ -3260,7 +2978,7 @@
               <a:buChar char=""/>
             </a:pPr>
             <a:r>
-              <a:rPr lang="bg-BG" sz="3200" strike="noStrike">
+              <a:rPr lang="en-US" sz="3200" strike="noStrike">
                 <a:solidFill>
                   <a:srgbClr val="f2f2f2"/>
                 </a:solidFill>
@@ -3279,7 +2997,7 @@
               <a:buChar char=""/>
             </a:pPr>
             <a:r>
-              <a:rPr lang="bg-BG" sz="3200" strike="noStrike">
+              <a:rPr lang="en-US" sz="3200" strike="noStrike">
                 <a:solidFill>
                   <a:srgbClr val="f2f2f2"/>
                 </a:solidFill>
@@ -3298,7 +3016,7 @@
               <a:buChar char=""/>
             </a:pPr>
             <a:r>
-              <a:rPr lang="bg-BG" sz="3200" strike="noStrike">
+              <a:rPr lang="en-US" sz="3200" strike="noStrike">
                 <a:solidFill>
                   <a:srgbClr val="f2f2f2"/>
                 </a:solidFill>
@@ -3317,7 +3035,7 @@
               <a:buChar char=""/>
             </a:pPr>
             <a:r>
-              <a:rPr lang="bg-BG" sz="3200" strike="noStrike">
+              <a:rPr lang="en-US" sz="3200" strike="noStrike">
                 <a:solidFill>
                   <a:srgbClr val="f2f2f2"/>
                 </a:solidFill>
@@ -3380,14 +3098,14 @@
       </p:grpSpPr>
       <p:sp>
         <p:nvSpPr>
-          <p:cNvPr id="82" name="TextShape 1"/>
-          <p:cNvSpPr txBox="1"/>
+          <p:cNvPr id="76" name="CustomShape 1"/>
+          <p:cNvSpPr/>
           <p:nvPr/>
         </p:nvSpPr>
         <p:spPr>
           <a:xfrm>
             <a:off x="838080" y="685800"/>
-            <a:ext cx="8229240" cy="1142640"/>
+            <a:ext cx="8228880" cy="1142280"/>
           </a:xfrm>
           <a:prstGeom prst="rect">
             <a:avLst/>
@@ -3397,8 +3115,14 @@
             <a:noFill/>
           </a:ln>
         </p:spPr>
-        <p:txBody>
-          <a:bodyPr anchor="ctr"/>
+        <p:style>
+          <a:lnRef idx="0"/>
+          <a:fillRef idx="0"/>
+          <a:effectRef idx="0"/>
+          <a:fontRef idx="minor"/>
+        </p:style>
+        <p:txBody>
+          <a:bodyPr lIns="90000" rIns="90000" tIns="45000" bIns="45000" anchor="ctr"/>
           <a:p>
             <a:pPr>
               <a:lnSpc>
@@ -3406,7 +3130,7 @@
               </a:lnSpc>
             </a:pPr>
             <a:r>
-              <a:rPr lang="bg-BG" sz="4400" strike="noStrike">
+              <a:rPr lang="en-US" sz="4400" strike="noStrike">
                 <a:solidFill>
                   <a:srgbClr val="f79646"/>
                 </a:solidFill>
@@ -3420,14 +3144,14 @@
       </p:sp>
       <p:sp>
         <p:nvSpPr>
-          <p:cNvPr id="83" name="TextShape 2"/>
-          <p:cNvSpPr txBox="1"/>
+          <p:cNvPr id="77" name="CustomShape 2"/>
+          <p:cNvSpPr/>
           <p:nvPr/>
         </p:nvSpPr>
         <p:spPr>
           <a:xfrm>
             <a:off x="762120" y="1676520"/>
-            <a:ext cx="7619760" cy="4525560"/>
+            <a:ext cx="7619400" cy="4525200"/>
           </a:xfrm>
           <a:prstGeom prst="rect">
             <a:avLst/>
@@ -3437,8 +3161,14 @@
             <a:noFill/>
           </a:ln>
         </p:spPr>
-        <p:txBody>
-          <a:bodyPr/>
+        <p:style>
+          <a:lnRef idx="0"/>
+          <a:fillRef idx="0"/>
+          <a:effectRef idx="0"/>
+          <a:fontRef idx="minor"/>
+        </p:style>
+        <p:txBody>
+          <a:bodyPr lIns="90000" rIns="90000" tIns="45000" bIns="45000"/>
           <a:p>
             <a:pPr>
               <a:lnSpc>
@@ -3448,7 +3178,7 @@
               <a:buChar char=""/>
             </a:pPr>
             <a:r>
-              <a:rPr lang="bg-BG" sz="3200" strike="noStrike">
+              <a:rPr lang="en-US" sz="3200" strike="noStrike">
                 <a:solidFill>
                   <a:srgbClr val="f2f2f2"/>
                 </a:solidFill>
@@ -3467,7 +3197,7 @@
               <a:buChar char=""/>
             </a:pPr>
             <a:r>
-              <a:rPr lang="bg-BG" sz="3200" strike="noStrike">
+              <a:rPr lang="en-US" sz="3200" strike="noStrike">
                 <a:solidFill>
                   <a:srgbClr val="f2f2f2"/>
                 </a:solidFill>
@@ -3486,7 +3216,7 @@
               <a:buChar char=""/>
             </a:pPr>
             <a:r>
-              <a:rPr lang="bg-BG" sz="3200" strike="noStrike">
+              <a:rPr lang="en-US" sz="3200" strike="noStrike">
                 <a:solidFill>
                   <a:srgbClr val="f2f2f2"/>
                 </a:solidFill>
@@ -3505,7 +3235,7 @@
               <a:buChar char=""/>
             </a:pPr>
             <a:r>
-              <a:rPr lang="bg-BG" sz="3200" strike="noStrike">
+              <a:rPr lang="en-US" sz="3200" strike="noStrike">
                 <a:solidFill>
                   <a:srgbClr val="f2f2f2"/>
                 </a:solidFill>
@@ -3568,14 +3298,14 @@
       </p:grpSpPr>
       <p:sp>
         <p:nvSpPr>
-          <p:cNvPr id="84" name="TextShape 1"/>
-          <p:cNvSpPr txBox="1"/>
+          <p:cNvPr id="78" name="CustomShape 1"/>
+          <p:cNvSpPr/>
           <p:nvPr/>
         </p:nvSpPr>
         <p:spPr>
           <a:xfrm>
             <a:off x="838080" y="685800"/>
-            <a:ext cx="8229240" cy="1142640"/>
+            <a:ext cx="8228880" cy="1142280"/>
           </a:xfrm>
           <a:prstGeom prst="rect">
             <a:avLst/>
@@ -3585,8 +3315,14 @@
             <a:noFill/>
           </a:ln>
         </p:spPr>
-        <p:txBody>
-          <a:bodyPr anchor="ctr"/>
+        <p:style>
+          <a:lnRef idx="0"/>
+          <a:fillRef idx="0"/>
+          <a:effectRef idx="0"/>
+          <a:fontRef idx="minor"/>
+        </p:style>
+        <p:txBody>
+          <a:bodyPr lIns="90000" rIns="90000" tIns="45000" bIns="45000" anchor="ctr"/>
           <a:p>
             <a:pPr>
               <a:lnSpc>
@@ -3594,7 +3330,7 @@
               </a:lnSpc>
             </a:pPr>
             <a:r>
-              <a:rPr lang="bg-BG" sz="4400" strike="noStrike">
+              <a:rPr lang="en-US" sz="4400" strike="noStrike">
                 <a:solidFill>
                   <a:srgbClr val="f79646"/>
                 </a:solidFill>
@@ -3608,14 +3344,14 @@
       </p:sp>
       <p:sp>
         <p:nvSpPr>
-          <p:cNvPr id="85" name="TextShape 2"/>
-          <p:cNvSpPr txBox="1"/>
+          <p:cNvPr id="79" name="CustomShape 2"/>
+          <p:cNvSpPr/>
           <p:nvPr/>
         </p:nvSpPr>
         <p:spPr>
           <a:xfrm>
             <a:off x="762120" y="1676520"/>
-            <a:ext cx="7619760" cy="4525560"/>
+            <a:ext cx="7619400" cy="4525200"/>
           </a:xfrm>
           <a:prstGeom prst="rect">
             <a:avLst/>
@@ -3625,8 +3361,14 @@
             <a:noFill/>
           </a:ln>
         </p:spPr>
-        <p:txBody>
-          <a:bodyPr/>
+        <p:style>
+          <a:lnRef idx="0"/>
+          <a:fillRef idx="0"/>
+          <a:effectRef idx="0"/>
+          <a:fontRef idx="minor"/>
+        </p:style>
+        <p:txBody>
+          <a:bodyPr lIns="90000" rIns="90000" tIns="45000" bIns="45000"/>
           <a:p>
             <a:pPr>
               <a:lnSpc>
@@ -3636,7 +3378,7 @@
               <a:buChar char=""/>
             </a:pPr>
             <a:r>
-              <a:rPr lang="bg-BG" sz="3200" strike="noStrike">
+              <a:rPr lang="en-US" sz="3200" strike="noStrike">
                 <a:solidFill>
                   <a:srgbClr val="f2f2f2"/>
                 </a:solidFill>
@@ -3655,7 +3397,7 @@
               <a:buChar char=""/>
             </a:pPr>
             <a:r>
-              <a:rPr lang="bg-BG" sz="3200" strike="noStrike">
+              <a:rPr lang="en-US" sz="3200" strike="noStrike">
                 <a:solidFill>
                   <a:srgbClr val="f2f2f2"/>
                 </a:solidFill>
@@ -3674,7 +3416,7 @@
               <a:buChar char=""/>
             </a:pPr>
             <a:r>
-              <a:rPr lang="bg-BG" sz="3200" strike="noStrike">
+              <a:rPr lang="en-US" sz="3200" strike="noStrike">
                 <a:solidFill>
                   <a:srgbClr val="f2f2f2"/>
                 </a:solidFill>
@@ -3737,14 +3479,14 @@
       </p:grpSpPr>
       <p:sp>
         <p:nvSpPr>
-          <p:cNvPr id="86" name="TextShape 1"/>
-          <p:cNvSpPr txBox="1"/>
+          <p:cNvPr id="80" name="CustomShape 1"/>
+          <p:cNvSpPr/>
           <p:nvPr/>
         </p:nvSpPr>
         <p:spPr>
           <a:xfrm>
             <a:off x="838080" y="685800"/>
-            <a:ext cx="8229240" cy="1142640"/>
+            <a:ext cx="8228880" cy="1142280"/>
           </a:xfrm>
           <a:prstGeom prst="rect">
             <a:avLst/>
@@ -3754,8 +3496,14 @@
             <a:noFill/>
           </a:ln>
         </p:spPr>
-        <p:txBody>
-          <a:bodyPr anchor="ctr"/>
+        <p:style>
+          <a:lnRef idx="0"/>
+          <a:fillRef idx="0"/>
+          <a:effectRef idx="0"/>
+          <a:fontRef idx="minor"/>
+        </p:style>
+        <p:txBody>
+          <a:bodyPr lIns="90000" rIns="90000" tIns="45000" bIns="45000" anchor="ctr"/>
           <a:p>
             <a:pPr>
               <a:lnSpc>
@@ -3763,7 +3511,7 @@
               </a:lnSpc>
             </a:pPr>
             <a:r>
-              <a:rPr lang="bg-BG" sz="4400" strike="noStrike">
+              <a:rPr lang="en-US" sz="4400" strike="noStrike">
                 <a:solidFill>
                   <a:srgbClr val="f79646"/>
                 </a:solidFill>
@@ -3777,14 +3525,14 @@
       </p:sp>
       <p:sp>
         <p:nvSpPr>
-          <p:cNvPr id="87" name="TextShape 2"/>
-          <p:cNvSpPr txBox="1"/>
+          <p:cNvPr id="81" name="CustomShape 2"/>
+          <p:cNvSpPr/>
           <p:nvPr/>
         </p:nvSpPr>
         <p:spPr>
           <a:xfrm>
             <a:off x="762120" y="1676520"/>
-            <a:ext cx="7619760" cy="4525560"/>
+            <a:ext cx="7619400" cy="4525200"/>
           </a:xfrm>
           <a:prstGeom prst="rect">
             <a:avLst/>
@@ -3794,8 +3542,14 @@
             <a:noFill/>
           </a:ln>
         </p:spPr>
-        <p:txBody>
-          <a:bodyPr/>
+        <p:style>
+          <a:lnRef idx="0"/>
+          <a:fillRef idx="0"/>
+          <a:effectRef idx="0"/>
+          <a:fontRef idx="minor"/>
+        </p:style>
+        <p:txBody>
+          <a:bodyPr lIns="90000" rIns="90000" tIns="45000" bIns="45000"/>
           <a:p>
             <a:pPr>
               <a:lnSpc>
@@ -3832,7 +3586,7 @@
       </p:sp>
       <p:pic>
         <p:nvPicPr>
-          <p:cNvPr id="88" name="Picture 2" descr=""/>
+          <p:cNvPr id="82" name="Picture 2" descr=""/>
           <p:cNvPicPr/>
           <p:nvPr/>
         </p:nvPicPr>
@@ -3843,7 +3597,7 @@
         <p:spPr>
           <a:xfrm>
             <a:off x="3372120" y="2057400"/>
-            <a:ext cx="2418840" cy="2418840"/>
+            <a:ext cx="2418480" cy="2418480"/>
           </a:xfrm>
           <a:prstGeom prst="rect">
             <a:avLst/>
@@ -3904,14 +3658,14 @@
       </p:grpSpPr>
       <p:sp>
         <p:nvSpPr>
-          <p:cNvPr id="89" name="TextShape 1"/>
-          <p:cNvSpPr txBox="1"/>
+          <p:cNvPr id="83" name="CustomShape 1"/>
+          <p:cNvSpPr/>
           <p:nvPr/>
         </p:nvSpPr>
         <p:spPr>
           <a:xfrm>
             <a:off x="838080" y="685800"/>
-            <a:ext cx="8229240" cy="1142640"/>
+            <a:ext cx="8228880" cy="1142280"/>
           </a:xfrm>
           <a:prstGeom prst="rect">
             <a:avLst/>
@@ -3921,8 +3675,14 @@
             <a:noFill/>
           </a:ln>
         </p:spPr>
-        <p:txBody>
-          <a:bodyPr anchor="ctr"/>
+        <p:style>
+          <a:lnRef idx="0"/>
+          <a:fillRef idx="0"/>
+          <a:effectRef idx="0"/>
+          <a:fontRef idx="minor"/>
+        </p:style>
+        <p:txBody>
+          <a:bodyPr lIns="90000" rIns="90000" tIns="45000" bIns="45000" anchor="ctr"/>
           <a:p>
             <a:pPr>
               <a:lnSpc>
@@ -3930,7 +3690,7 @@
               </a:lnSpc>
             </a:pPr>
             <a:r>
-              <a:rPr lang="bg-BG" sz="4400" strike="noStrike">
+              <a:rPr lang="en-US" sz="4400" strike="noStrike">
                 <a:solidFill>
                   <a:srgbClr val="f79646"/>
                 </a:solidFill>
@@ -3944,14 +3704,14 @@
       </p:sp>
       <p:sp>
         <p:nvSpPr>
-          <p:cNvPr id="90" name="TextShape 2"/>
-          <p:cNvSpPr txBox="1"/>
+          <p:cNvPr id="84" name="CustomShape 2"/>
+          <p:cNvSpPr/>
           <p:nvPr/>
         </p:nvSpPr>
         <p:spPr>
           <a:xfrm>
             <a:off x="762120" y="1676520"/>
-            <a:ext cx="6400440" cy="4525560"/>
+            <a:ext cx="6400080" cy="4525200"/>
           </a:xfrm>
           <a:prstGeom prst="rect">
             <a:avLst/>
@@ -3961,8 +3721,14 @@
             <a:noFill/>
           </a:ln>
         </p:spPr>
-        <p:txBody>
-          <a:bodyPr/>
+        <p:style>
+          <a:lnRef idx="0"/>
+          <a:fillRef idx="0"/>
+          <a:effectRef idx="0"/>
+          <a:fontRef idx="minor"/>
+        </p:style>
+        <p:txBody>
+          <a:bodyPr lIns="90000" rIns="90000" tIns="45000" bIns="45000"/>
           <a:p>
             <a:pPr>
               <a:lnSpc>
@@ -3972,25 +3738,16 @@
               <a:buChar char=""/>
             </a:pPr>
             <a:r>
-              <a:rPr lang="bg-BG" sz="3200" strike="noStrike" u="sng">
+              <a:rPr lang="en-US" sz="3200" strike="noStrike" u="sng">
                 <a:solidFill>
                   <a:srgbClr val="0000f2"/>
                 </a:solidFill>
                 <a:latin typeface="Calibri"/>
               </a:rPr>
-              <a:t>http://sourceforge.net/projects/gitextensions</a:t>
+              <a:t>http://sourceforge.net/projects/gitextensions/</a:t>
             </a:r>
             <a:r>
-              <a:rPr lang="bg-BG" sz="3200" strike="noStrike" u="sng">
-                <a:solidFill>
-                  <a:srgbClr val="0000f2"/>
-                </a:solidFill>
-                <a:latin typeface="Calibri"/>
-              </a:rPr>
-              <a:t>/</a:t>
-            </a:r>
-            <a:r>
-              <a:rPr lang="bg-BG" sz="3200" strike="noStrike">
+              <a:rPr lang="en-US" sz="3200" strike="noStrike">
                 <a:solidFill>
                   <a:srgbClr val="f2f2f2"/>
                 </a:solidFill>
@@ -4053,14 +3810,14 @@
       </p:grpSpPr>
       <p:sp>
         <p:nvSpPr>
-          <p:cNvPr id="91" name="TextShape 1"/>
-          <p:cNvSpPr txBox="1"/>
+          <p:cNvPr id="85" name="CustomShape 1"/>
+          <p:cNvSpPr/>
           <p:nvPr/>
         </p:nvSpPr>
         <p:spPr>
           <a:xfrm>
             <a:off x="838080" y="685800"/>
-            <a:ext cx="8229240" cy="1142640"/>
+            <a:ext cx="8228880" cy="1142280"/>
           </a:xfrm>
           <a:prstGeom prst="rect">
             <a:avLst/>
@@ -4070,8 +3827,14 @@
             <a:noFill/>
           </a:ln>
         </p:spPr>
-        <p:txBody>
-          <a:bodyPr anchor="ctr"/>
+        <p:style>
+          <a:lnRef idx="0"/>
+          <a:fillRef idx="0"/>
+          <a:effectRef idx="0"/>
+          <a:fontRef idx="minor"/>
+        </p:style>
+        <p:txBody>
+          <a:bodyPr lIns="90000" rIns="90000" tIns="45000" bIns="45000" anchor="ctr"/>
           <a:p>
             <a:pPr>
               <a:lnSpc>
@@ -4079,7 +3842,7 @@
               </a:lnSpc>
             </a:pPr>
             <a:r>
-              <a:rPr lang="bg-BG" sz="4400" strike="noStrike">
+              <a:rPr lang="en-US" sz="4400" strike="noStrike">
                 <a:solidFill>
                   <a:srgbClr val="f79646"/>
                 </a:solidFill>
@@ -4093,14 +3856,14 @@
       </p:sp>
       <p:sp>
         <p:nvSpPr>
-          <p:cNvPr id="92" name="TextShape 2"/>
-          <p:cNvSpPr txBox="1"/>
+          <p:cNvPr id="86" name="CustomShape 2"/>
+          <p:cNvSpPr/>
           <p:nvPr/>
         </p:nvSpPr>
         <p:spPr>
           <a:xfrm>
             <a:off x="762120" y="1676520"/>
-            <a:ext cx="7619760" cy="4525560"/>
+            <a:ext cx="7619400" cy="4525200"/>
           </a:xfrm>
           <a:prstGeom prst="rect">
             <a:avLst/>
@@ -4110,8 +3873,14 @@
             <a:noFill/>
           </a:ln>
         </p:spPr>
-        <p:txBody>
-          <a:bodyPr/>
+        <p:style>
+          <a:lnRef idx="0"/>
+          <a:fillRef idx="0"/>
+          <a:effectRef idx="0"/>
+          <a:fontRef idx="minor"/>
+        </p:style>
+        <p:txBody>
+          <a:bodyPr lIns="90000" rIns="90000" tIns="45000" bIns="45000"/>
           <a:p>
             <a:pPr>
               <a:lnSpc>
@@ -4121,7 +3890,7 @@
               <a:buChar char=""/>
             </a:pPr>
             <a:r>
-              <a:rPr lang="bg-BG" sz="3200" strike="noStrike">
+              <a:rPr lang="en-US" sz="3200" strike="noStrike">
                 <a:solidFill>
                   <a:srgbClr val="f2f2f2"/>
                 </a:solidFill>
@@ -4140,7 +3909,7 @@
               <a:buChar char=""/>
             </a:pPr>
             <a:r>
-              <a:rPr lang="bg-BG" sz="3200" strike="noStrike">
+              <a:rPr lang="en-US" sz="3200" strike="noStrike">
                 <a:solidFill>
                   <a:srgbClr val="f2f2f2"/>
                 </a:solidFill>
@@ -4159,7 +3928,7 @@
               <a:buChar char=""/>
             </a:pPr>
             <a:r>
-              <a:rPr lang="bg-BG" sz="3200" strike="noStrike">
+              <a:rPr lang="en-US" sz="3200" strike="noStrike">
                 <a:solidFill>
                   <a:srgbClr val="f2f2f2"/>
                 </a:solidFill>
@@ -4222,14 +3991,14 @@
       </p:grpSpPr>
       <p:sp>
         <p:nvSpPr>
-          <p:cNvPr id="93" name="TextShape 1"/>
-          <p:cNvSpPr txBox="1"/>
+          <p:cNvPr id="87" name="CustomShape 1"/>
+          <p:cNvSpPr/>
           <p:nvPr/>
         </p:nvSpPr>
         <p:spPr>
           <a:xfrm>
             <a:off x="838080" y="685800"/>
-            <a:ext cx="8229240" cy="1142640"/>
+            <a:ext cx="8228880" cy="1142280"/>
           </a:xfrm>
           <a:prstGeom prst="rect">
             <a:avLst/>
@@ -4239,8 +4008,14 @@
             <a:noFill/>
           </a:ln>
         </p:spPr>
-        <p:txBody>
-          <a:bodyPr anchor="ctr"/>
+        <p:style>
+          <a:lnRef idx="0"/>
+          <a:fillRef idx="0"/>
+          <a:effectRef idx="0"/>
+          <a:fontRef idx="minor"/>
+        </p:style>
+        <p:txBody>
+          <a:bodyPr lIns="90000" rIns="90000" tIns="45000" bIns="45000" anchor="ctr"/>
           <a:p>
             <a:pPr>
               <a:lnSpc>
@@ -4248,7 +4023,7 @@
               </a:lnSpc>
             </a:pPr>
             <a:r>
-              <a:rPr lang="bg-BG" sz="4400" strike="noStrike">
+              <a:rPr lang="en-US" sz="4400" strike="noStrike">
                 <a:solidFill>
                   <a:srgbClr val="f79646"/>
                 </a:solidFill>
@@ -4262,14 +4037,14 @@
       </p:sp>
       <p:sp>
         <p:nvSpPr>
-          <p:cNvPr id="94" name="TextShape 2"/>
-          <p:cNvSpPr txBox="1"/>
+          <p:cNvPr id="88" name="CustomShape 2"/>
+          <p:cNvSpPr/>
           <p:nvPr/>
         </p:nvSpPr>
         <p:spPr>
           <a:xfrm>
             <a:off x="762120" y="1676520"/>
-            <a:ext cx="7619760" cy="4525560"/>
+            <a:ext cx="7619400" cy="4525200"/>
           </a:xfrm>
           <a:prstGeom prst="rect">
             <a:avLst/>
@@ -4279,8 +4054,14 @@
             <a:noFill/>
           </a:ln>
         </p:spPr>
-        <p:txBody>
-          <a:bodyPr/>
+        <p:style>
+          <a:lnRef idx="0"/>
+          <a:fillRef idx="0"/>
+          <a:effectRef idx="0"/>
+          <a:fontRef idx="minor"/>
+        </p:style>
+        <p:txBody>
+          <a:bodyPr lIns="90000" rIns="90000" tIns="45000" bIns="45000"/>
           <a:p>
             <a:pPr>
               <a:lnSpc>
@@ -4317,7 +4098,7 @@
       </p:sp>
       <p:pic>
         <p:nvPicPr>
-          <p:cNvPr id="95" name="Picture 3" descr=""/>
+          <p:cNvPr id="89" name="Picture 3" descr=""/>
           <p:cNvPicPr/>
           <p:nvPr/>
         </p:nvPicPr>
@@ -4328,7 +4109,7 @@
         <p:spPr>
           <a:xfrm>
             <a:off x="3505320" y="2057400"/>
-            <a:ext cx="2418840" cy="2418840"/>
+            <a:ext cx="2418480" cy="2418480"/>
           </a:xfrm>
           <a:prstGeom prst="rect">
             <a:avLst/>
@@ -4389,14 +4170,14 @@
       </p:grpSpPr>
       <p:sp>
         <p:nvSpPr>
-          <p:cNvPr id="96" name="TextShape 1"/>
-          <p:cNvSpPr txBox="1"/>
+          <p:cNvPr id="90" name="CustomShape 1"/>
+          <p:cNvSpPr/>
           <p:nvPr/>
         </p:nvSpPr>
         <p:spPr>
           <a:xfrm>
             <a:off x="838080" y="685800"/>
-            <a:ext cx="8229240" cy="1142640"/>
+            <a:ext cx="8228880" cy="1142280"/>
           </a:xfrm>
           <a:prstGeom prst="rect">
             <a:avLst/>
@@ -4406,8 +4187,14 @@
             <a:noFill/>
           </a:ln>
         </p:spPr>
-        <p:txBody>
-          <a:bodyPr anchor="ctr"/>
+        <p:style>
+          <a:lnRef idx="0"/>
+          <a:fillRef idx="0"/>
+          <a:effectRef idx="0"/>
+          <a:fontRef idx="minor"/>
+        </p:style>
+        <p:txBody>
+          <a:bodyPr lIns="90000" rIns="90000" tIns="45000" bIns="45000" anchor="ctr"/>
           <a:p>
             <a:pPr>
               <a:lnSpc>
@@ -4415,7 +4202,7 @@
               </a:lnSpc>
             </a:pPr>
             <a:r>
-              <a:rPr lang="bg-BG" sz="4400" strike="noStrike">
+              <a:rPr lang="en-US" sz="4400" strike="noStrike">
                 <a:solidFill>
                   <a:srgbClr val="f79646"/>
                 </a:solidFill>
@@ -4429,14 +4216,14 @@
       </p:sp>
       <p:sp>
         <p:nvSpPr>
-          <p:cNvPr id="97" name="TextShape 2"/>
-          <p:cNvSpPr txBox="1"/>
+          <p:cNvPr id="91" name="CustomShape 2"/>
+          <p:cNvSpPr/>
           <p:nvPr/>
         </p:nvSpPr>
         <p:spPr>
           <a:xfrm>
             <a:off x="731520" y="1875240"/>
-            <a:ext cx="7619760" cy="4525560"/>
+            <a:ext cx="7619400" cy="4525200"/>
           </a:xfrm>
           <a:prstGeom prst="rect">
             <a:avLst/>
@@ -4446,8 +4233,14 @@
             <a:noFill/>
           </a:ln>
         </p:spPr>
-        <p:txBody>
-          <a:bodyPr/>
+        <p:style>
+          <a:lnRef idx="0"/>
+          <a:fillRef idx="0"/>
+          <a:effectRef idx="0"/>
+          <a:fontRef idx="minor"/>
+        </p:style>
+        <p:txBody>
+          <a:bodyPr lIns="90000" rIns="90000" tIns="45000" bIns="45000"/>
           <a:p>
             <a:pPr>
               <a:lnSpc>
@@ -4457,13 +4250,13 @@
               <a:buChar char=""/>
             </a:pPr>
             <a:r>
-              <a:rPr lang="bg-BG" sz="3200" strike="noStrike">
+              <a:rPr lang="en-US" sz="3200" strike="noStrike">
                 <a:solidFill>
                   <a:srgbClr val="f2f2f2"/>
                 </a:solidFill>
                 <a:latin typeface="Calibri"/>
               </a:rPr>
-              <a:t>Инсталирайте Git Extensions</a:t>
+              <a:t>Инсталирайте Git Extensions, SmartGit</a:t>
             </a:r>
             <a:endParaRPr/>
           </a:p>
@@ -4476,7 +4269,7 @@
               <a:buChar char=""/>
             </a:pPr>
             <a:r>
-              <a:rPr lang="bg-BG" sz="3200" strike="noStrike">
+              <a:rPr lang="en-US" sz="3200" strike="noStrike">
                 <a:solidFill>
                   <a:srgbClr val="f2f2f2"/>
                 </a:solidFill>
@@ -4495,7 +4288,7 @@
               <a:buChar char=""/>
             </a:pPr>
             <a:r>
-              <a:rPr lang="bg-BG" sz="3200" strike="noStrike">
+              <a:rPr lang="en-US" sz="3200" strike="noStrike">
                 <a:solidFill>
                   <a:srgbClr val="f2f2f2"/>
                 </a:solidFill>

</xml_diff>